<commit_message>
Präsi Julien done / Doku update
</commit_message>
<xml_diff>
--- a/docs/presentation/presentation_adolf_villiger.pptx
+++ b/docs/presentation/presentation_adolf_villiger.pptx
@@ -5,35 +5,27 @@
     <p:sldMasterId id="2147483669" r:id="rId4"/>
   </p:sldMasterIdLst>
   <p:notesMasterIdLst>
-    <p:notesMasterId r:id="rId28"/>
+    <p:notesMasterId r:id="rId20"/>
   </p:notesMasterIdLst>
   <p:handoutMasterIdLst>
-    <p:handoutMasterId r:id="rId29"/>
+    <p:handoutMasterId r:id="rId21"/>
   </p:handoutMasterIdLst>
   <p:sldIdLst>
-    <p:sldId id="259" r:id="rId5"/>
-    <p:sldId id="257" r:id="rId6"/>
-    <p:sldId id="270" r:id="rId7"/>
-    <p:sldId id="273" r:id="rId8"/>
-    <p:sldId id="274" r:id="rId9"/>
-    <p:sldId id="275" r:id="rId10"/>
-    <p:sldId id="276" r:id="rId11"/>
-    <p:sldId id="277" r:id="rId12"/>
-    <p:sldId id="278" r:id="rId13"/>
-    <p:sldId id="279" r:id="rId14"/>
-    <p:sldId id="280" r:id="rId15"/>
-    <p:sldId id="281" r:id="rId16"/>
-    <p:sldId id="283" r:id="rId17"/>
-    <p:sldId id="286" r:id="rId18"/>
-    <p:sldId id="284" r:id="rId19"/>
-    <p:sldId id="285" r:id="rId20"/>
-    <p:sldId id="262" r:id="rId21"/>
-    <p:sldId id="263" r:id="rId22"/>
-    <p:sldId id="258" r:id="rId23"/>
-    <p:sldId id="265" r:id="rId24"/>
-    <p:sldId id="264" r:id="rId25"/>
-    <p:sldId id="269" r:id="rId26"/>
-    <p:sldId id="266" r:id="rId27"/>
+    <p:sldId id="257" r:id="rId5"/>
+    <p:sldId id="270" r:id="rId6"/>
+    <p:sldId id="273" r:id="rId7"/>
+    <p:sldId id="274" r:id="rId8"/>
+    <p:sldId id="275" r:id="rId9"/>
+    <p:sldId id="276" r:id="rId10"/>
+    <p:sldId id="277" r:id="rId11"/>
+    <p:sldId id="278" r:id="rId12"/>
+    <p:sldId id="279" r:id="rId13"/>
+    <p:sldId id="280" r:id="rId14"/>
+    <p:sldId id="281" r:id="rId15"/>
+    <p:sldId id="283" r:id="rId16"/>
+    <p:sldId id="286" r:id="rId17"/>
+    <p:sldId id="284" r:id="rId18"/>
+    <p:sldId id="285" r:id="rId19"/>
   </p:sldIdLst>
   <p:sldSz cx="9144000" cy="6858000" type="screen4x3"/>
   <p:notesSz cx="6797675" cy="9872663"/>
@@ -164,7 +156,7 @@
   </p:defaultTextStyle>
   <p:extLst>
     <p:ext uri="{EFAFB233-063F-42B5-8137-9DF3F51BA10A}">
-      <p15:sldGuideLst xmlns:p15="http://schemas.microsoft.com/office/powerpoint/2012/main" xmlns="">
+      <p15:sldGuideLst xmlns:p15="http://schemas.microsoft.com/office/powerpoint/2012/main">
         <p15:guide id="1" orient="horz" pos="2160">
           <p15:clr>
             <a:srgbClr val="A4A3A4"/>
@@ -178,7 +170,7 @@
       </p15:sldGuideLst>
     </p:ext>
     <p:ext uri="{2D200454-40CA-4A62-9FC3-DE9A4176ACB9}">
-      <p15:notesGuideLst xmlns:p15="http://schemas.microsoft.com/office/powerpoint/2012/main" xmlns="">
+      <p15:notesGuideLst xmlns:p15="http://schemas.microsoft.com/office/powerpoint/2012/main">
         <p15:guide id="1" orient="horz" pos="3110">
           <p15:clr>
             <a:srgbClr val="A4A3A4"/>
@@ -708,6 +700,756 @@
     </a:lvl9pPr>
   </p:notesStyle>
 </p:notesMaster>
+</file>
+
+<file path=ppt/notesSlides/notesSlide1.xml><?xml version="1.0" encoding="utf-8"?>
+<p:notes xmlns:a="http://schemas.openxmlformats.org/drawingml/2006/main" xmlns:r="http://schemas.openxmlformats.org/officeDocument/2006/relationships" xmlns:p="http://schemas.openxmlformats.org/presentationml/2006/main">
+  <p:cSld>
+    <p:spTree>
+      <p:nvGrpSpPr>
+        <p:cNvPr id="1" name=""/>
+        <p:cNvGrpSpPr/>
+        <p:nvPr/>
+      </p:nvGrpSpPr>
+      <p:grpSpPr>
+        <a:xfrm>
+          <a:off x="0" y="0"/>
+          <a:ext cx="0" cy="0"/>
+          <a:chOff x="0" y="0"/>
+          <a:chExt cx="0" cy="0"/>
+        </a:xfrm>
+      </p:grpSpPr>
+      <p:sp>
+        <p:nvSpPr>
+          <p:cNvPr id="2" name="Folienbildplatzhalter 1"/>
+          <p:cNvSpPr>
+            <a:spLocks noGrp="1" noRot="1" noChangeAspect="1"/>
+          </p:cNvSpPr>
+          <p:nvPr>
+            <p:ph type="sldImg"/>
+          </p:nvPr>
+        </p:nvSpPr>
+        <p:spPr/>
+      </p:sp>
+      <p:sp>
+        <p:nvSpPr>
+          <p:cNvPr id="3" name="Notizenplatzhalter 2"/>
+          <p:cNvSpPr>
+            <a:spLocks noGrp="1"/>
+          </p:cNvSpPr>
+          <p:nvPr>
+            <p:ph type="body" idx="1"/>
+          </p:nvPr>
+        </p:nvSpPr>
+        <p:spPr/>
+        <p:txBody>
+          <a:bodyPr/>
+          <a:lstStyle/>
+          <a:p>
+            <a:pPr marL="171450" indent="-171450">
+              <a:buFontTx/>
+              <a:buChar char="-"/>
+            </a:pPr>
+            <a:r>
+              <a:rPr lang="de-CH" baseline="0" dirty="0" smtClean="0"/>
+              <a:t>Erklärung Ausgangslage:</a:t>
+            </a:r>
+          </a:p>
+          <a:p>
+            <a:pPr marL="628650" lvl="1" indent="-171450">
+              <a:buFontTx/>
+              <a:buChar char="-"/>
+            </a:pPr>
+            <a:r>
+              <a:rPr lang="de-CH" baseline="0" dirty="0" smtClean="0"/>
+              <a:t>4 Varianten. Alle mittels </a:t>
+            </a:r>
+            <a:r>
+              <a:rPr lang="de-CH" baseline="0" dirty="0" err="1" smtClean="0"/>
+              <a:t>MiddleVR</a:t>
+            </a:r>
+            <a:r>
+              <a:rPr lang="de-CH" baseline="0" dirty="0" smtClean="0"/>
+              <a:t> oder eigener Lösung umsetzbar.</a:t>
+            </a:r>
+          </a:p>
+          <a:p>
+            <a:pPr marL="628650" lvl="1" indent="-171450">
+              <a:buFontTx/>
+              <a:buChar char="-"/>
+            </a:pPr>
+            <a:endParaRPr lang="de-CH" baseline="0" dirty="0" smtClean="0"/>
+          </a:p>
+          <a:p>
+            <a:pPr marL="171450" lvl="0" indent="-171450">
+              <a:buFontTx/>
+              <a:buChar char="-"/>
+            </a:pPr>
+            <a:r>
+              <a:rPr lang="de-CH" baseline="0" dirty="0" smtClean="0"/>
+              <a:t>Kurze Beschreibung zu sämtlichen Varianten.</a:t>
+            </a:r>
+          </a:p>
+        </p:txBody>
+      </p:sp>
+      <p:sp>
+        <p:nvSpPr>
+          <p:cNvPr id="4" name="Foliennummernplatzhalter 3"/>
+          <p:cNvSpPr>
+            <a:spLocks noGrp="1"/>
+          </p:cNvSpPr>
+          <p:nvPr>
+            <p:ph type="sldNum" sz="quarter" idx="10"/>
+          </p:nvPr>
+        </p:nvSpPr>
+        <p:spPr/>
+        <p:txBody>
+          <a:bodyPr/>
+          <a:lstStyle/>
+          <a:p>
+            <a:fld id="{37E44704-8E6D-4CF2-8CFA-A0F7BC751896}" type="slidenum">
+              <a:rPr lang="de-CH" smtClean="0"/>
+              <a:t>2</a:t>
+            </a:fld>
+            <a:endParaRPr lang="de-CH"/>
+          </a:p>
+        </p:txBody>
+      </p:sp>
+    </p:spTree>
+    <p:extLst>
+      <p:ext uri="{BB962C8B-B14F-4D97-AF65-F5344CB8AC3E}">
+        <p14:creationId xmlns:p14="http://schemas.microsoft.com/office/powerpoint/2010/main" val="1790274636"/>
+      </p:ext>
+    </p:extLst>
+  </p:cSld>
+  <p:clrMapOvr>
+    <a:masterClrMapping/>
+  </p:clrMapOvr>
+</p:notes>
+</file>
+
+<file path=ppt/notesSlides/notesSlide2.xml><?xml version="1.0" encoding="utf-8"?>
+<p:notes xmlns:a="http://schemas.openxmlformats.org/drawingml/2006/main" xmlns:r="http://schemas.openxmlformats.org/officeDocument/2006/relationships" xmlns:p="http://schemas.openxmlformats.org/presentationml/2006/main">
+  <p:cSld>
+    <p:spTree>
+      <p:nvGrpSpPr>
+        <p:cNvPr id="1" name=""/>
+        <p:cNvGrpSpPr/>
+        <p:nvPr/>
+      </p:nvGrpSpPr>
+      <p:grpSpPr>
+        <a:xfrm>
+          <a:off x="0" y="0"/>
+          <a:ext cx="0" cy="0"/>
+          <a:chOff x="0" y="0"/>
+          <a:chExt cx="0" cy="0"/>
+        </a:xfrm>
+      </p:grpSpPr>
+      <p:sp>
+        <p:nvSpPr>
+          <p:cNvPr id="2" name="Folienbildplatzhalter 1"/>
+          <p:cNvSpPr>
+            <a:spLocks noGrp="1" noRot="1" noChangeAspect="1"/>
+          </p:cNvSpPr>
+          <p:nvPr>
+            <p:ph type="sldImg"/>
+          </p:nvPr>
+        </p:nvSpPr>
+        <p:spPr/>
+      </p:sp>
+      <p:sp>
+        <p:nvSpPr>
+          <p:cNvPr id="3" name="Notizenplatzhalter 2"/>
+          <p:cNvSpPr>
+            <a:spLocks noGrp="1"/>
+          </p:cNvSpPr>
+          <p:nvPr>
+            <p:ph type="body" idx="1"/>
+          </p:nvPr>
+        </p:nvSpPr>
+        <p:spPr/>
+        <p:txBody>
+          <a:bodyPr/>
+          <a:lstStyle/>
+          <a:p>
+            <a:endParaRPr lang="en-US" dirty="0"/>
+          </a:p>
+        </p:txBody>
+      </p:sp>
+      <p:sp>
+        <p:nvSpPr>
+          <p:cNvPr id="4" name="Foliennummernplatzhalter 3"/>
+          <p:cNvSpPr>
+            <a:spLocks noGrp="1"/>
+          </p:cNvSpPr>
+          <p:nvPr>
+            <p:ph type="sldNum" sz="quarter" idx="10"/>
+          </p:nvPr>
+        </p:nvSpPr>
+        <p:spPr/>
+        <p:txBody>
+          <a:bodyPr/>
+          <a:lstStyle/>
+          <a:p>
+            <a:fld id="{37E44704-8E6D-4CF2-8CFA-A0F7BC751896}" type="slidenum">
+              <a:rPr lang="de-CH" smtClean="0"/>
+              <a:t>3</a:t>
+            </a:fld>
+            <a:endParaRPr lang="de-CH"/>
+          </a:p>
+        </p:txBody>
+      </p:sp>
+    </p:spTree>
+    <p:extLst>
+      <p:ext uri="{BB962C8B-B14F-4D97-AF65-F5344CB8AC3E}">
+        <p14:creationId xmlns:p14="http://schemas.microsoft.com/office/powerpoint/2010/main" val="3087320079"/>
+      </p:ext>
+    </p:extLst>
+  </p:cSld>
+  <p:clrMapOvr>
+    <a:masterClrMapping/>
+  </p:clrMapOvr>
+</p:notes>
+</file>
+
+<file path=ppt/notesSlides/notesSlide3.xml><?xml version="1.0" encoding="utf-8"?>
+<p:notes xmlns:a="http://schemas.openxmlformats.org/drawingml/2006/main" xmlns:r="http://schemas.openxmlformats.org/officeDocument/2006/relationships" xmlns:p="http://schemas.openxmlformats.org/presentationml/2006/main">
+  <p:cSld>
+    <p:spTree>
+      <p:nvGrpSpPr>
+        <p:cNvPr id="1" name=""/>
+        <p:cNvGrpSpPr/>
+        <p:nvPr/>
+      </p:nvGrpSpPr>
+      <p:grpSpPr>
+        <a:xfrm>
+          <a:off x="0" y="0"/>
+          <a:ext cx="0" cy="0"/>
+          <a:chOff x="0" y="0"/>
+          <a:chExt cx="0" cy="0"/>
+        </a:xfrm>
+      </p:grpSpPr>
+      <p:sp>
+        <p:nvSpPr>
+          <p:cNvPr id="2" name="Folienbildplatzhalter 1"/>
+          <p:cNvSpPr>
+            <a:spLocks noGrp="1" noRot="1" noChangeAspect="1"/>
+          </p:cNvSpPr>
+          <p:nvPr>
+            <p:ph type="sldImg"/>
+          </p:nvPr>
+        </p:nvSpPr>
+        <p:spPr/>
+      </p:sp>
+      <p:sp>
+        <p:nvSpPr>
+          <p:cNvPr id="3" name="Notizenplatzhalter 2"/>
+          <p:cNvSpPr>
+            <a:spLocks noGrp="1"/>
+          </p:cNvSpPr>
+          <p:nvPr>
+            <p:ph type="body" idx="1"/>
+          </p:nvPr>
+        </p:nvSpPr>
+        <p:spPr/>
+        <p:txBody>
+          <a:bodyPr/>
+          <a:lstStyle/>
+          <a:p>
+            <a:r>
+              <a:rPr lang="de-CH" dirty="0" smtClean="0"/>
+              <a:t>- Keine native Fullscreen Funktionalität: Fullscreen immer auf 1 Output beschränkt.</a:t>
+            </a:r>
+            <a:endParaRPr lang="en-US" dirty="0"/>
+          </a:p>
+        </p:txBody>
+      </p:sp>
+      <p:sp>
+        <p:nvSpPr>
+          <p:cNvPr id="4" name="Foliennummernplatzhalter 3"/>
+          <p:cNvSpPr>
+            <a:spLocks noGrp="1"/>
+          </p:cNvSpPr>
+          <p:nvPr>
+            <p:ph type="sldNum" sz="quarter" idx="10"/>
+          </p:nvPr>
+        </p:nvSpPr>
+        <p:spPr/>
+        <p:txBody>
+          <a:bodyPr/>
+          <a:lstStyle/>
+          <a:p>
+            <a:fld id="{37E44704-8E6D-4CF2-8CFA-A0F7BC751896}" type="slidenum">
+              <a:rPr lang="de-CH" smtClean="0"/>
+              <a:t>6</a:t>
+            </a:fld>
+            <a:endParaRPr lang="de-CH"/>
+          </a:p>
+        </p:txBody>
+      </p:sp>
+    </p:spTree>
+    <p:extLst>
+      <p:ext uri="{BB962C8B-B14F-4D97-AF65-F5344CB8AC3E}">
+        <p14:creationId xmlns:p14="http://schemas.microsoft.com/office/powerpoint/2010/main" val="945318991"/>
+      </p:ext>
+    </p:extLst>
+  </p:cSld>
+  <p:clrMapOvr>
+    <a:masterClrMapping/>
+  </p:clrMapOvr>
+</p:notes>
+</file>
+
+<file path=ppt/notesSlides/notesSlide4.xml><?xml version="1.0" encoding="utf-8"?>
+<p:notes xmlns:a="http://schemas.openxmlformats.org/drawingml/2006/main" xmlns:r="http://schemas.openxmlformats.org/officeDocument/2006/relationships" xmlns:p="http://schemas.openxmlformats.org/presentationml/2006/main">
+  <p:cSld>
+    <p:spTree>
+      <p:nvGrpSpPr>
+        <p:cNvPr id="1" name=""/>
+        <p:cNvGrpSpPr/>
+        <p:nvPr/>
+      </p:nvGrpSpPr>
+      <p:grpSpPr>
+        <a:xfrm>
+          <a:off x="0" y="0"/>
+          <a:ext cx="0" cy="0"/>
+          <a:chOff x="0" y="0"/>
+          <a:chExt cx="0" cy="0"/>
+        </a:xfrm>
+      </p:grpSpPr>
+      <p:sp>
+        <p:nvSpPr>
+          <p:cNvPr id="2" name="Folienbildplatzhalter 1"/>
+          <p:cNvSpPr>
+            <a:spLocks noGrp="1" noRot="1" noChangeAspect="1"/>
+          </p:cNvSpPr>
+          <p:nvPr>
+            <p:ph type="sldImg"/>
+          </p:nvPr>
+        </p:nvSpPr>
+        <p:spPr/>
+      </p:sp>
+      <p:sp>
+        <p:nvSpPr>
+          <p:cNvPr id="3" name="Notizenplatzhalter 2"/>
+          <p:cNvSpPr>
+            <a:spLocks noGrp="1"/>
+          </p:cNvSpPr>
+          <p:nvPr>
+            <p:ph type="body" idx="1"/>
+          </p:nvPr>
+        </p:nvSpPr>
+        <p:spPr/>
+        <p:txBody>
+          <a:bodyPr/>
+          <a:lstStyle/>
+          <a:p>
+            <a:r>
+              <a:rPr lang="de-CH" dirty="0" smtClean="0"/>
+              <a:t>- 4 </a:t>
+            </a:r>
+            <a:r>
+              <a:rPr lang="de-CH" dirty="0" err="1" smtClean="0"/>
+              <a:t>Beamer</a:t>
+            </a:r>
+            <a:r>
+              <a:rPr lang="de-CH" dirty="0" smtClean="0"/>
+              <a:t>: Um </a:t>
+            </a:r>
+            <a:r>
+              <a:rPr lang="de-CH" dirty="0" err="1" smtClean="0"/>
+              <a:t>Stereoskpie</a:t>
+            </a:r>
+            <a:r>
+              <a:rPr lang="de-CH" dirty="0" smtClean="0"/>
+              <a:t> zu testen </a:t>
+            </a:r>
+            <a:r>
+              <a:rPr lang="de-CH" dirty="0" err="1" smtClean="0"/>
+              <a:t>Beamer</a:t>
+            </a:r>
+            <a:r>
+              <a:rPr lang="de-CH" dirty="0" smtClean="0"/>
+              <a:t> umbauen, mit Verzicht auf 1</a:t>
+            </a:r>
+            <a:r>
+              <a:rPr lang="de-CH" baseline="0" dirty="0" smtClean="0"/>
+              <a:t> Leinwand.</a:t>
+            </a:r>
+            <a:endParaRPr lang="en-US" dirty="0"/>
+          </a:p>
+        </p:txBody>
+      </p:sp>
+      <p:sp>
+        <p:nvSpPr>
+          <p:cNvPr id="4" name="Foliennummernplatzhalter 3"/>
+          <p:cNvSpPr>
+            <a:spLocks noGrp="1"/>
+          </p:cNvSpPr>
+          <p:nvPr>
+            <p:ph type="sldNum" sz="quarter" idx="10"/>
+          </p:nvPr>
+        </p:nvSpPr>
+        <p:spPr/>
+        <p:txBody>
+          <a:bodyPr/>
+          <a:lstStyle/>
+          <a:p>
+            <a:fld id="{37E44704-8E6D-4CF2-8CFA-A0F7BC751896}" type="slidenum">
+              <a:rPr lang="de-CH" smtClean="0"/>
+              <a:t>8</a:t>
+            </a:fld>
+            <a:endParaRPr lang="de-CH"/>
+          </a:p>
+        </p:txBody>
+      </p:sp>
+    </p:spTree>
+    <p:extLst>
+      <p:ext uri="{BB962C8B-B14F-4D97-AF65-F5344CB8AC3E}">
+        <p14:creationId xmlns:p14="http://schemas.microsoft.com/office/powerpoint/2010/main" val="3134393393"/>
+      </p:ext>
+    </p:extLst>
+  </p:cSld>
+  <p:clrMapOvr>
+    <a:masterClrMapping/>
+  </p:clrMapOvr>
+</p:notes>
+</file>
+
+<file path=ppt/notesSlides/notesSlide5.xml><?xml version="1.0" encoding="utf-8"?>
+<p:notes xmlns:a="http://schemas.openxmlformats.org/drawingml/2006/main" xmlns:r="http://schemas.openxmlformats.org/officeDocument/2006/relationships" xmlns:p="http://schemas.openxmlformats.org/presentationml/2006/main">
+  <p:cSld>
+    <p:spTree>
+      <p:nvGrpSpPr>
+        <p:cNvPr id="1" name=""/>
+        <p:cNvGrpSpPr/>
+        <p:nvPr/>
+      </p:nvGrpSpPr>
+      <p:grpSpPr>
+        <a:xfrm>
+          <a:off x="0" y="0"/>
+          <a:ext cx="0" cy="0"/>
+          <a:chOff x="0" y="0"/>
+          <a:chExt cx="0" cy="0"/>
+        </a:xfrm>
+      </p:grpSpPr>
+      <p:sp>
+        <p:nvSpPr>
+          <p:cNvPr id="2" name="Folienbildplatzhalter 1"/>
+          <p:cNvSpPr>
+            <a:spLocks noGrp="1" noRot="1" noChangeAspect="1"/>
+          </p:cNvSpPr>
+          <p:nvPr>
+            <p:ph type="sldImg"/>
+          </p:nvPr>
+        </p:nvSpPr>
+        <p:spPr/>
+      </p:sp>
+      <p:sp>
+        <p:nvSpPr>
+          <p:cNvPr id="3" name="Notizenplatzhalter 2"/>
+          <p:cNvSpPr>
+            <a:spLocks noGrp="1"/>
+          </p:cNvSpPr>
+          <p:nvPr>
+            <p:ph type="body" idx="1"/>
+          </p:nvPr>
+        </p:nvSpPr>
+        <p:spPr/>
+        <p:txBody>
+          <a:bodyPr/>
+          <a:lstStyle/>
+          <a:p>
+            <a:r>
+              <a:rPr lang="de-CH" b="1" dirty="0" smtClean="0"/>
+              <a:t>Basic</a:t>
+            </a:r>
+          </a:p>
+          <a:p>
+            <a:pPr marL="171450" indent="-171450">
+              <a:buFontTx/>
+              <a:buChar char="-"/>
+            </a:pPr>
+            <a:r>
+              <a:rPr lang="de-CH" baseline="0" dirty="0" smtClean="0"/>
+              <a:t>Grundlegende Lauffähigkeit des Systems testen.</a:t>
+            </a:r>
+          </a:p>
+          <a:p>
+            <a:pPr marL="171450" indent="-171450">
+              <a:buFontTx/>
+              <a:buChar char="-"/>
+            </a:pPr>
+            <a:r>
+              <a:rPr lang="de-CH" baseline="0" dirty="0" smtClean="0"/>
+              <a:t>Kein grosser Datentransfer.</a:t>
+            </a:r>
+          </a:p>
+          <a:p>
+            <a:pPr marL="171450" indent="-171450">
+              <a:buFontTx/>
+              <a:buChar char="-"/>
+            </a:pPr>
+            <a:endParaRPr lang="de-CH" baseline="0" dirty="0" smtClean="0"/>
+          </a:p>
+          <a:p>
+            <a:pPr marL="0" indent="0">
+              <a:buFontTx/>
+              <a:buNone/>
+            </a:pPr>
+            <a:r>
+              <a:rPr lang="de-CH" b="1" baseline="0" dirty="0" smtClean="0"/>
+              <a:t>Basic Extended</a:t>
+            </a:r>
+          </a:p>
+          <a:p>
+            <a:pPr marL="171450" indent="-171450">
+              <a:buFontTx/>
+              <a:buChar char="-"/>
+            </a:pPr>
+            <a:r>
+              <a:rPr lang="de-CH" baseline="0" dirty="0" smtClean="0"/>
+              <a:t>Schachbrettwände um Perspektive / Ausrichtung der Kameras im CAVE zu prüfen.</a:t>
+            </a:r>
+          </a:p>
+          <a:p>
+            <a:pPr marL="171450" indent="-171450">
+              <a:buFontTx/>
+              <a:buChar char="-"/>
+            </a:pPr>
+            <a:r>
+              <a:rPr lang="de-CH" baseline="0" dirty="0" smtClean="0"/>
+              <a:t>Physikalische Kugeln, um Positionsabgleich zu testen.</a:t>
+            </a:r>
+          </a:p>
+          <a:p>
+            <a:pPr marL="171450" indent="-171450">
+              <a:buFontTx/>
+              <a:buChar char="-"/>
+            </a:pPr>
+            <a:r>
+              <a:rPr lang="de-CH" baseline="0" dirty="0" smtClean="0"/>
+              <a:t>Per Knopfdruck Farbe der Kugeln ändern.</a:t>
+            </a:r>
+            <a:endParaRPr lang="en-US" dirty="0"/>
+          </a:p>
+        </p:txBody>
+      </p:sp>
+      <p:sp>
+        <p:nvSpPr>
+          <p:cNvPr id="4" name="Foliennummernplatzhalter 3"/>
+          <p:cNvSpPr>
+            <a:spLocks noGrp="1"/>
+          </p:cNvSpPr>
+          <p:nvPr>
+            <p:ph type="sldNum" sz="quarter" idx="10"/>
+          </p:nvPr>
+        </p:nvSpPr>
+        <p:spPr/>
+        <p:txBody>
+          <a:bodyPr/>
+          <a:lstStyle/>
+          <a:p>
+            <a:fld id="{37E44704-8E6D-4CF2-8CFA-A0F7BC751896}" type="slidenum">
+              <a:rPr lang="de-CH" smtClean="0"/>
+              <a:t>9</a:t>
+            </a:fld>
+            <a:endParaRPr lang="de-CH"/>
+          </a:p>
+        </p:txBody>
+      </p:sp>
+    </p:spTree>
+    <p:extLst>
+      <p:ext uri="{BB962C8B-B14F-4D97-AF65-F5344CB8AC3E}">
+        <p14:creationId xmlns:p14="http://schemas.microsoft.com/office/powerpoint/2010/main" val="3324325654"/>
+      </p:ext>
+    </p:extLst>
+  </p:cSld>
+  <p:clrMapOvr>
+    <a:masterClrMapping/>
+  </p:clrMapOvr>
+</p:notes>
+</file>
+
+<file path=ppt/notesSlides/notesSlide6.xml><?xml version="1.0" encoding="utf-8"?>
+<p:notes xmlns:a="http://schemas.openxmlformats.org/drawingml/2006/main" xmlns:r="http://schemas.openxmlformats.org/officeDocument/2006/relationships" xmlns:p="http://schemas.openxmlformats.org/presentationml/2006/main">
+  <p:cSld>
+    <p:spTree>
+      <p:nvGrpSpPr>
+        <p:cNvPr id="1" name=""/>
+        <p:cNvGrpSpPr/>
+        <p:nvPr/>
+      </p:nvGrpSpPr>
+      <p:grpSpPr>
+        <a:xfrm>
+          <a:off x="0" y="0"/>
+          <a:ext cx="0" cy="0"/>
+          <a:chOff x="0" y="0"/>
+          <a:chExt cx="0" cy="0"/>
+        </a:xfrm>
+      </p:grpSpPr>
+      <p:sp>
+        <p:nvSpPr>
+          <p:cNvPr id="2" name="Folienbildplatzhalter 1"/>
+          <p:cNvSpPr>
+            <a:spLocks noGrp="1" noRot="1" noChangeAspect="1"/>
+          </p:cNvSpPr>
+          <p:nvPr>
+            <p:ph type="sldImg"/>
+          </p:nvPr>
+        </p:nvSpPr>
+        <p:spPr/>
+      </p:sp>
+      <p:sp>
+        <p:nvSpPr>
+          <p:cNvPr id="3" name="Notizenplatzhalter 2"/>
+          <p:cNvSpPr>
+            <a:spLocks noGrp="1"/>
+          </p:cNvSpPr>
+          <p:nvPr>
+            <p:ph type="body" idx="1"/>
+          </p:nvPr>
+        </p:nvSpPr>
+        <p:spPr/>
+        <p:txBody>
+          <a:bodyPr/>
+          <a:lstStyle/>
+          <a:p>
+            <a:r>
+              <a:rPr lang="de-CH" b="1" dirty="0" err="1" smtClean="0"/>
+              <a:t>AngryBots</a:t>
+            </a:r>
+            <a:endParaRPr lang="de-CH" b="1" dirty="0" smtClean="0"/>
+          </a:p>
+          <a:p>
+            <a:pPr marL="171450" indent="-171450">
+              <a:buFontTx/>
+              <a:buChar char="-"/>
+            </a:pPr>
+            <a:r>
+              <a:rPr lang="de-CH" dirty="0" smtClean="0"/>
+              <a:t>Beispielprojekt</a:t>
+            </a:r>
+            <a:r>
+              <a:rPr lang="de-CH" baseline="0" dirty="0" smtClean="0"/>
+              <a:t> </a:t>
+            </a:r>
+            <a:r>
+              <a:rPr lang="de-CH" baseline="0" dirty="0" err="1" smtClean="0"/>
+              <a:t>Unity</a:t>
+            </a:r>
+            <a:r>
+              <a:rPr lang="de-CH" baseline="0" dirty="0" smtClean="0"/>
+              <a:t> 4.</a:t>
+            </a:r>
+          </a:p>
+          <a:p>
+            <a:pPr marL="171450" indent="-171450">
+              <a:buFontTx/>
+              <a:buChar char="-"/>
+            </a:pPr>
+            <a:r>
+              <a:rPr lang="de-CH" baseline="0" dirty="0" smtClean="0"/>
+              <a:t>Geeigneter Showcase der Möglichkeiten von </a:t>
+            </a:r>
+            <a:r>
+              <a:rPr lang="de-CH" baseline="0" dirty="0" err="1" smtClean="0"/>
+              <a:t>Unity</a:t>
+            </a:r>
+            <a:r>
+              <a:rPr lang="de-CH" baseline="0" dirty="0" smtClean="0"/>
+              <a:t> (Effekte, detaillierte Models, </a:t>
+            </a:r>
+            <a:r>
+              <a:rPr lang="de-CH" baseline="0" dirty="0" err="1" smtClean="0"/>
+              <a:t>Shaders</a:t>
+            </a:r>
+            <a:r>
+              <a:rPr lang="de-CH" baseline="0" dirty="0" smtClean="0"/>
+              <a:t>, Partikel, sonstige </a:t>
+            </a:r>
+            <a:r>
+              <a:rPr lang="de-CH" baseline="0" dirty="0" err="1" smtClean="0"/>
+              <a:t>Keyfeatures</a:t>
+            </a:r>
+            <a:r>
+              <a:rPr lang="de-CH" baseline="0" dirty="0" smtClean="0"/>
+              <a:t>).</a:t>
+            </a:r>
+          </a:p>
+          <a:p>
+            <a:pPr marL="171450" indent="-171450">
+              <a:buFontTx/>
+              <a:buChar char="-"/>
+            </a:pPr>
+            <a:endParaRPr lang="de-CH" baseline="0" dirty="0" smtClean="0"/>
+          </a:p>
+          <a:p>
+            <a:pPr marL="0" indent="0">
+              <a:buFontTx/>
+              <a:buNone/>
+            </a:pPr>
+            <a:r>
+              <a:rPr lang="de-CH" b="1" baseline="0" dirty="0" smtClean="0"/>
+              <a:t>Car Tutorial</a:t>
+            </a:r>
+          </a:p>
+          <a:p>
+            <a:pPr marL="171450" indent="-171450">
+              <a:buFontTx/>
+              <a:buChar char="-"/>
+            </a:pPr>
+            <a:r>
+              <a:rPr lang="de-CH" b="0" baseline="0" dirty="0" smtClean="0"/>
+              <a:t>Autorennspiel.</a:t>
+            </a:r>
+          </a:p>
+          <a:p>
+            <a:pPr marL="171450" indent="-171450">
+              <a:buFontTx/>
+              <a:buChar char="-"/>
+            </a:pPr>
+            <a:r>
+              <a:rPr lang="de-CH" b="0" baseline="0" dirty="0" smtClean="0"/>
+              <a:t>Physik testen.</a:t>
+            </a:r>
+          </a:p>
+        </p:txBody>
+      </p:sp>
+      <p:sp>
+        <p:nvSpPr>
+          <p:cNvPr id="4" name="Foliennummernplatzhalter 3"/>
+          <p:cNvSpPr>
+            <a:spLocks noGrp="1"/>
+          </p:cNvSpPr>
+          <p:nvPr>
+            <p:ph type="sldNum" sz="quarter" idx="10"/>
+          </p:nvPr>
+        </p:nvSpPr>
+        <p:spPr/>
+        <p:txBody>
+          <a:bodyPr/>
+          <a:lstStyle/>
+          <a:p>
+            <a:fld id="{37E44704-8E6D-4CF2-8CFA-A0F7BC751896}" type="slidenum">
+              <a:rPr lang="de-CH" smtClean="0"/>
+              <a:t>10</a:t>
+            </a:fld>
+            <a:endParaRPr lang="de-CH"/>
+          </a:p>
+        </p:txBody>
+      </p:sp>
+    </p:spTree>
+    <p:extLst>
+      <p:ext uri="{BB962C8B-B14F-4D97-AF65-F5344CB8AC3E}">
+        <p14:creationId xmlns:p14="http://schemas.microsoft.com/office/powerpoint/2010/main" val="3445443403"/>
+      </p:ext>
+    </p:extLst>
+  </p:cSld>
+  <p:clrMapOvr>
+    <a:masterClrMapping/>
+  </p:clrMapOvr>
+</p:notes>
 </file>
 
 <file path=ppt/slideLayouts/slideLayout1.xml><?xml version="1.0" encoding="utf-8"?>
@@ -6649,7 +7391,7 @@
       </p:grpSpPr>
       <p:sp>
         <p:nvSpPr>
-          <p:cNvPr id="2" name="Titel 1"/>
+          <p:cNvPr id="5" name="Titel 4"/>
           <p:cNvSpPr>
             <a:spLocks noGrp="1"/>
           </p:cNvSpPr>
@@ -6662,13 +7404,21 @@
           <a:bodyPr/>
           <a:lstStyle/>
           <a:p>
-            <a:endParaRPr lang="de-CH"/>
-          </a:p>
-        </p:txBody>
-      </p:sp>
-      <p:sp>
-        <p:nvSpPr>
-          <p:cNvPr id="3" name="Untertitel 2"/>
+            <a:r>
+              <a:rPr lang="de-CH" dirty="0" smtClean="0"/>
+              <a:t>Ausgangslage </a:t>
+            </a:r>
+            <a:r>
+              <a:rPr lang="de-CH" dirty="0" err="1" smtClean="0"/>
+              <a:t>Prototyping</a:t>
+            </a:r>
+            <a:endParaRPr lang="de-CH" dirty="0"/>
+          </a:p>
+        </p:txBody>
+      </p:sp>
+      <p:sp>
+        <p:nvSpPr>
+          <p:cNvPr id="6" name="Untertitel 5"/>
           <p:cNvSpPr>
             <a:spLocks noGrp="1"/>
           </p:cNvSpPr>
@@ -6685,29 +7435,10 @@
           </a:p>
         </p:txBody>
       </p:sp>
-      <p:sp>
-        <p:nvSpPr>
-          <p:cNvPr id="4" name="Textplatzhalter 3"/>
-          <p:cNvSpPr>
-            <a:spLocks noGrp="1"/>
-          </p:cNvSpPr>
-          <p:nvPr>
-            <p:ph type="body" sz="quarter" idx="13"/>
-          </p:nvPr>
-        </p:nvSpPr>
-        <p:spPr/>
-        <p:txBody>
-          <a:bodyPr/>
-          <a:lstStyle/>
-          <a:p>
-            <a:endParaRPr lang="de-CH"/>
-          </a:p>
-        </p:txBody>
-      </p:sp>
     </p:spTree>
     <p:extLst>
       <p:ext uri="{BB962C8B-B14F-4D97-AF65-F5344CB8AC3E}">
-        <p14:creationId xmlns:p14="http://schemas.microsoft.com/office/powerpoint/2010/main" val="1801327458"/>
+        <p14:creationId xmlns:p14="http://schemas.microsoft.com/office/powerpoint/2010/main" val="3399875752"/>
       </p:ext>
     </p:extLst>
   </p:cSld>
@@ -6783,8 +7514,8 @@
           <a:lstStyle/>
           <a:p>
             <a:r>
-              <a:rPr lang="de-CH" dirty="0" smtClean="0"/>
-              <a:t>Basic</a:t>
+              <a:rPr lang="de-CH" dirty="0" err="1" smtClean="0"/>
+              <a:t>AngryBots</a:t>
             </a:r>
             <a:endParaRPr lang="de-CH" dirty="0"/>
           </a:p>
@@ -6800,175 +7531,8 @@
             <p:ph sz="half" idx="13"/>
           </p:nvPr>
         </p:nvPicPr>
-        <p:blipFill>
-          <a:blip r:embed="rId2">
-            <a:extLst>
-              <a:ext uri="{28A0092B-C50C-407E-A947-70E740481C1C}">
-                <a14:useLocalDpi xmlns:a14="http://schemas.microsoft.com/office/drawing/2010/main" val="0"/>
-              </a:ext>
-            </a:extLst>
-          </a:blip>
-          <a:stretch>
-            <a:fillRect/>
-          </a:stretch>
-        </p:blipFill>
-        <p:spPr>
-          <a:xfrm>
-            <a:off x="468312" y="1980000"/>
-            <a:ext cx="4050000" cy="2800800"/>
-          </a:xfrm>
-        </p:spPr>
-      </p:pic>
-      <p:sp>
-        <p:nvSpPr>
-          <p:cNvPr id="5" name="Textplatzhalter 4"/>
-          <p:cNvSpPr>
-            <a:spLocks noGrp="1"/>
-          </p:cNvSpPr>
-          <p:nvPr>
-            <p:ph type="body" idx="14"/>
-          </p:nvPr>
-        </p:nvSpPr>
-        <p:spPr/>
-        <p:txBody>
-          <a:bodyPr/>
-          <a:lstStyle/>
-          <a:p>
-            <a:r>
-              <a:rPr lang="de-CH" dirty="0" smtClean="0"/>
-              <a:t>Basic Extended</a:t>
-            </a:r>
-            <a:endParaRPr lang="de-CH" dirty="0"/>
-          </a:p>
-        </p:txBody>
-      </p:sp>
-      <p:pic>
-        <p:nvPicPr>
-          <p:cNvPr id="8" name="Inhaltsplatzhalter 7"/>
-          <p:cNvPicPr>
-            <a:picLocks noGrp="1" noChangeAspect="1"/>
-          </p:cNvPicPr>
-          <p:nvPr>
-            <p:ph sz="half" idx="15"/>
-          </p:nvPr>
-        </p:nvPicPr>
-        <p:blipFill>
+        <p:blipFill rotWithShape="1">
           <a:blip r:embed="rId3">
-            <a:extLst>
-              <a:ext uri="{28A0092B-C50C-407E-A947-70E740481C1C}">
-                <a14:useLocalDpi xmlns:a14="http://schemas.microsoft.com/office/drawing/2010/main" val="0"/>
-              </a:ext>
-            </a:extLst>
-          </a:blip>
-          <a:stretch>
-            <a:fillRect/>
-          </a:stretch>
-        </p:blipFill>
-        <p:spPr>
-          <a:xfrm>
-            <a:off x="4589463" y="1980000"/>
-            <a:ext cx="4051300" cy="2799911"/>
-          </a:xfrm>
-        </p:spPr>
-      </p:pic>
-    </p:spTree>
-    <p:extLst>
-      <p:ext uri="{BB962C8B-B14F-4D97-AF65-F5344CB8AC3E}">
-        <p14:creationId xmlns:p14="http://schemas.microsoft.com/office/powerpoint/2010/main" val="3105073695"/>
-      </p:ext>
-    </p:extLst>
-  </p:cSld>
-  <p:clrMapOvr>
-    <a:masterClrMapping/>
-  </p:clrMapOvr>
-  <p:timing>
-    <p:tnLst>
-      <p:par>
-        <p:cTn id="1" dur="indefinite" restart="never" nodeType="tmRoot"/>
-      </p:par>
-    </p:tnLst>
-  </p:timing>
-</p:sld>
-</file>
-
-<file path=ppt/slides/slide11.xml><?xml version="1.0" encoding="utf-8"?>
-<p:sld xmlns:a="http://schemas.openxmlformats.org/drawingml/2006/main" xmlns:r="http://schemas.openxmlformats.org/officeDocument/2006/relationships" xmlns:p="http://schemas.openxmlformats.org/presentationml/2006/main">
-  <p:cSld>
-    <p:spTree>
-      <p:nvGrpSpPr>
-        <p:cNvPr id="1" name=""/>
-        <p:cNvGrpSpPr/>
-        <p:nvPr/>
-      </p:nvGrpSpPr>
-      <p:grpSpPr>
-        <a:xfrm>
-          <a:off x="0" y="0"/>
-          <a:ext cx="0" cy="0"/>
-          <a:chOff x="0" y="0"/>
-          <a:chExt cx="0" cy="0"/>
-        </a:xfrm>
-      </p:grpSpPr>
-      <p:sp>
-        <p:nvSpPr>
-          <p:cNvPr id="2" name="Titel 1"/>
-          <p:cNvSpPr>
-            <a:spLocks noGrp="1"/>
-          </p:cNvSpPr>
-          <p:nvPr>
-            <p:ph type="ctrTitle"/>
-          </p:nvPr>
-        </p:nvSpPr>
-        <p:spPr/>
-        <p:txBody>
-          <a:bodyPr/>
-          <a:lstStyle/>
-          <a:p>
-            <a:r>
-              <a:rPr lang="de-CH" dirty="0" err="1"/>
-              <a:t>Prototyping</a:t>
-            </a:r>
-            <a:r>
-              <a:rPr lang="de-CH" dirty="0"/>
-              <a:t> im CAVE</a:t>
-            </a:r>
-          </a:p>
-        </p:txBody>
-      </p:sp>
-      <p:sp>
-        <p:nvSpPr>
-          <p:cNvPr id="3" name="Textplatzhalter 2"/>
-          <p:cNvSpPr>
-            <a:spLocks noGrp="1"/>
-          </p:cNvSpPr>
-          <p:nvPr>
-            <p:ph type="body" idx="1"/>
-          </p:nvPr>
-        </p:nvSpPr>
-        <p:spPr/>
-        <p:txBody>
-          <a:bodyPr/>
-          <a:lstStyle/>
-          <a:p>
-            <a:r>
-              <a:rPr lang="de-CH" dirty="0" err="1" smtClean="0"/>
-              <a:t>AngryBots</a:t>
-            </a:r>
-            <a:endParaRPr lang="de-CH" dirty="0"/>
-          </a:p>
-        </p:txBody>
-      </p:sp>
-      <p:pic>
-        <p:nvPicPr>
-          <p:cNvPr id="7" name="Inhaltsplatzhalter 6"/>
-          <p:cNvPicPr>
-            <a:picLocks noGrp="1"/>
-          </p:cNvPicPr>
-          <p:nvPr>
-            <p:ph sz="half" idx="13"/>
-          </p:nvPr>
-        </p:nvPicPr>
-        <p:blipFill rotWithShape="1">
-          <a:blip r:embed="rId2">
             <a:extLst>
               <a:ext uri="{28A0092B-C50C-407E-A947-70E740481C1C}">
                 <a14:useLocalDpi xmlns:a14="http://schemas.microsoft.com/office/drawing/2010/main" val="0"/>
@@ -7019,7 +7583,7 @@
           </p:nvPr>
         </p:nvPicPr>
         <p:blipFill>
-          <a:blip r:embed="rId3">
+          <a:blip r:embed="rId4">
             <a:extLst>
               <a:ext uri="{28A0092B-C50C-407E-A947-70E740481C1C}">
                 <a14:useLocalDpi xmlns:a14="http://schemas.microsoft.com/office/drawing/2010/main" val="0"/>
@@ -7057,7 +7621,7 @@
 </p:sld>
 </file>
 
-<file path=ppt/slides/slide12.xml><?xml version="1.0" encoding="utf-8"?>
+<file path=ppt/slides/slide11.xml><?xml version="1.0" encoding="utf-8"?>
 <p:sld xmlns:a="http://schemas.openxmlformats.org/drawingml/2006/main" xmlns:r="http://schemas.openxmlformats.org/officeDocument/2006/relationships" xmlns:p="http://schemas.openxmlformats.org/presentationml/2006/main">
   <p:cSld>
     <p:spTree>
@@ -7149,7 +7713,7 @@
 </p:sld>
 </file>
 
-<file path=ppt/slides/slide13.xml><?xml version="1.0" encoding="utf-8"?>
+<file path=ppt/slides/slide12.xml><?xml version="1.0" encoding="utf-8"?>
 <p:sld xmlns:a="http://schemas.openxmlformats.org/drawingml/2006/main" xmlns:r="http://schemas.openxmlformats.org/officeDocument/2006/relationships" xmlns:p="http://schemas.openxmlformats.org/presentationml/2006/main">
   <p:cSld>
     <p:spTree>
@@ -7268,7 +7832,7 @@
 </p:sld>
 </file>
 
-<file path=ppt/slides/slide14.xml><?xml version="1.0" encoding="utf-8"?>
+<file path=ppt/slides/slide13.xml><?xml version="1.0" encoding="utf-8"?>
 <p:sld xmlns:a="http://schemas.openxmlformats.org/drawingml/2006/main" xmlns:r="http://schemas.openxmlformats.org/officeDocument/2006/relationships" xmlns:p="http://schemas.openxmlformats.org/presentationml/2006/main">
   <p:cSld>
     <p:spTree>
@@ -7387,7 +7951,7 @@
 </p:sld>
 </file>
 
-<file path=ppt/slides/slide15.xml><?xml version="1.0" encoding="utf-8"?>
+<file path=ppt/slides/slide14.xml><?xml version="1.0" encoding="utf-8"?>
 <p:sld xmlns:a="http://schemas.openxmlformats.org/drawingml/2006/main" xmlns:r="http://schemas.openxmlformats.org/officeDocument/2006/relationships" xmlns:p="http://schemas.openxmlformats.org/presentationml/2006/main">
   <p:cSld>
     <p:spTree>
@@ -7634,7 +8198,7 @@
 </p:sld>
 </file>
 
-<file path=ppt/slides/slide16.xml><?xml version="1.0" encoding="utf-8"?>
+<file path=ppt/slides/slide15.xml><?xml version="1.0" encoding="utf-8"?>
 <p:sld xmlns:a="http://schemas.openxmlformats.org/drawingml/2006/main" xmlns:r="http://schemas.openxmlformats.org/officeDocument/2006/relationships" xmlns:p="http://schemas.openxmlformats.org/presentationml/2006/main">
   <p:cSld>
     <p:spTree>
@@ -7751,7 +8315,15 @@
           <a:p>
             <a:r>
               <a:rPr lang="de-CH" dirty="0" smtClean="0"/>
-              <a:t>Primitiver Prototyp eigene Lösung</a:t>
+              <a:t>Umsetzung primitiver </a:t>
+            </a:r>
+            <a:r>
+              <a:rPr lang="de-CH" dirty="0" smtClean="0"/>
+              <a:t>Prototyp </a:t>
+            </a:r>
+            <a:r>
+              <a:rPr lang="de-CH" dirty="0" smtClean="0"/>
+              <a:t>«eigene Lösung»</a:t>
             </a:r>
             <a:endParaRPr lang="de-CH" dirty="0"/>
           </a:p>
@@ -7775,250 +8347,6 @@
     <p:extLst>
       <p:ext uri="{BB962C8B-B14F-4D97-AF65-F5344CB8AC3E}">
         <p14:creationId xmlns:p14="http://schemas.microsoft.com/office/powerpoint/2010/main" val="2125868922"/>
-      </p:ext>
-    </p:extLst>
-  </p:cSld>
-  <p:clrMapOvr>
-    <a:masterClrMapping/>
-  </p:clrMapOvr>
-  <p:timing>
-    <p:tnLst>
-      <p:par>
-        <p:cTn id="1" dur="indefinite" restart="never" nodeType="tmRoot"/>
-      </p:par>
-    </p:tnLst>
-  </p:timing>
-</p:sld>
-</file>
-
-<file path=ppt/slides/slide17.xml><?xml version="1.0" encoding="utf-8"?>
-<p:sld xmlns:a="http://schemas.openxmlformats.org/drawingml/2006/main" xmlns:r="http://schemas.openxmlformats.org/officeDocument/2006/relationships" xmlns:p="http://schemas.openxmlformats.org/presentationml/2006/main">
-  <p:cSld>
-    <p:spTree>
-      <p:nvGrpSpPr>
-        <p:cNvPr id="1" name=""/>
-        <p:cNvGrpSpPr/>
-        <p:nvPr/>
-      </p:nvGrpSpPr>
-      <p:grpSpPr>
-        <a:xfrm>
-          <a:off x="0" y="0"/>
-          <a:ext cx="0" cy="0"/>
-          <a:chOff x="0" y="0"/>
-          <a:chExt cx="0" cy="0"/>
-        </a:xfrm>
-      </p:grpSpPr>
-      <p:sp>
-        <p:nvSpPr>
-          <p:cNvPr id="2" name="Titel 1"/>
-          <p:cNvSpPr>
-            <a:spLocks noGrp="1"/>
-          </p:cNvSpPr>
-          <p:nvPr>
-            <p:ph type="ctrTitle"/>
-          </p:nvPr>
-        </p:nvSpPr>
-        <p:spPr/>
-        <p:txBody>
-          <a:bodyPr/>
-          <a:lstStyle/>
-          <a:p>
-            <a:endParaRPr lang="de-CH"/>
-          </a:p>
-        </p:txBody>
-      </p:sp>
-      <p:sp>
-        <p:nvSpPr>
-          <p:cNvPr id="3" name="Untertitel 2"/>
-          <p:cNvSpPr>
-            <a:spLocks noGrp="1"/>
-          </p:cNvSpPr>
-          <p:nvPr>
-            <p:ph type="subTitle" idx="1"/>
-          </p:nvPr>
-        </p:nvSpPr>
-        <p:spPr/>
-        <p:txBody>
-          <a:bodyPr/>
-          <a:lstStyle/>
-          <a:p>
-            <a:endParaRPr lang="de-CH"/>
-          </a:p>
-        </p:txBody>
-      </p:sp>
-    </p:spTree>
-    <p:extLst>
-      <p:ext uri="{BB962C8B-B14F-4D97-AF65-F5344CB8AC3E}">
-        <p14:creationId xmlns:p14="http://schemas.microsoft.com/office/powerpoint/2010/main" val="1284173973"/>
-      </p:ext>
-    </p:extLst>
-  </p:cSld>
-  <p:clrMapOvr>
-    <a:masterClrMapping/>
-  </p:clrMapOvr>
-  <p:timing>
-    <p:tnLst>
-      <p:par>
-        <p:cTn id="1" dur="indefinite" restart="never" nodeType="tmRoot"/>
-      </p:par>
-    </p:tnLst>
-  </p:timing>
-</p:sld>
-</file>
-
-<file path=ppt/slides/slide18.xml><?xml version="1.0" encoding="utf-8"?>
-<p:sld xmlns:a="http://schemas.openxmlformats.org/drawingml/2006/main" xmlns:r="http://schemas.openxmlformats.org/officeDocument/2006/relationships" xmlns:p="http://schemas.openxmlformats.org/presentationml/2006/main">
-  <p:cSld>
-    <p:spTree>
-      <p:nvGrpSpPr>
-        <p:cNvPr id="1" name=""/>
-        <p:cNvGrpSpPr/>
-        <p:nvPr/>
-      </p:nvGrpSpPr>
-      <p:grpSpPr>
-        <a:xfrm>
-          <a:off x="0" y="0"/>
-          <a:ext cx="0" cy="0"/>
-          <a:chOff x="0" y="0"/>
-          <a:chExt cx="0" cy="0"/>
-        </a:xfrm>
-      </p:grpSpPr>
-      <p:sp>
-        <p:nvSpPr>
-          <p:cNvPr id="2" name="Inhaltsplatzhalter 1"/>
-          <p:cNvSpPr>
-            <a:spLocks noGrp="1"/>
-          </p:cNvSpPr>
-          <p:nvPr>
-            <p:ph sz="half" idx="1"/>
-          </p:nvPr>
-        </p:nvSpPr>
-        <p:spPr/>
-        <p:txBody>
-          <a:bodyPr/>
-          <a:lstStyle/>
-          <a:p>
-            <a:endParaRPr lang="de-CH"/>
-          </a:p>
-        </p:txBody>
-      </p:sp>
-      <p:sp>
-        <p:nvSpPr>
-          <p:cNvPr id="3" name="Titel 2"/>
-          <p:cNvSpPr>
-            <a:spLocks noGrp="1"/>
-          </p:cNvSpPr>
-          <p:nvPr>
-            <p:ph type="ctrTitle"/>
-          </p:nvPr>
-        </p:nvSpPr>
-        <p:spPr/>
-        <p:txBody>
-          <a:bodyPr/>
-          <a:lstStyle/>
-          <a:p>
-            <a:endParaRPr lang="de-CH" dirty="0"/>
-          </a:p>
-        </p:txBody>
-      </p:sp>
-    </p:spTree>
-    <p:extLst>
-      <p:ext uri="{BB962C8B-B14F-4D97-AF65-F5344CB8AC3E}">
-        <p14:creationId xmlns:p14="http://schemas.microsoft.com/office/powerpoint/2010/main" val="3741675672"/>
-      </p:ext>
-    </p:extLst>
-  </p:cSld>
-  <p:clrMapOvr>
-    <a:masterClrMapping/>
-  </p:clrMapOvr>
-  <p:timing>
-    <p:tnLst>
-      <p:par>
-        <p:cTn id="1" dur="indefinite" restart="never" nodeType="tmRoot"/>
-      </p:par>
-    </p:tnLst>
-  </p:timing>
-</p:sld>
-</file>
-
-<file path=ppt/slides/slide19.xml><?xml version="1.0" encoding="utf-8"?>
-<p:sld xmlns:a="http://schemas.openxmlformats.org/drawingml/2006/main" xmlns:r="http://schemas.openxmlformats.org/officeDocument/2006/relationships" xmlns:p="http://schemas.openxmlformats.org/presentationml/2006/main">
-  <p:cSld>
-    <p:spTree>
-      <p:nvGrpSpPr>
-        <p:cNvPr id="1" name=""/>
-        <p:cNvGrpSpPr/>
-        <p:nvPr/>
-      </p:nvGrpSpPr>
-      <p:grpSpPr>
-        <a:xfrm>
-          <a:off x="0" y="0"/>
-          <a:ext cx="0" cy="0"/>
-          <a:chOff x="0" y="0"/>
-          <a:chExt cx="0" cy="0"/>
-        </a:xfrm>
-      </p:grpSpPr>
-      <p:sp>
-        <p:nvSpPr>
-          <p:cNvPr id="2" name="Titel 1"/>
-          <p:cNvSpPr>
-            <a:spLocks noGrp="1"/>
-          </p:cNvSpPr>
-          <p:nvPr>
-            <p:ph type="ctrTitle"/>
-          </p:nvPr>
-        </p:nvSpPr>
-        <p:spPr/>
-        <p:txBody>
-          <a:bodyPr/>
-          <a:lstStyle/>
-          <a:p>
-            <a:endParaRPr lang="de-CH"/>
-          </a:p>
-        </p:txBody>
-      </p:sp>
-      <p:sp>
-        <p:nvSpPr>
-          <p:cNvPr id="3" name="Textplatzhalter 2"/>
-          <p:cNvSpPr>
-            <a:spLocks noGrp="1"/>
-          </p:cNvSpPr>
-          <p:nvPr>
-            <p:ph type="body" idx="1"/>
-          </p:nvPr>
-        </p:nvSpPr>
-        <p:spPr/>
-        <p:txBody>
-          <a:bodyPr/>
-          <a:lstStyle/>
-          <a:p>
-            <a:endParaRPr lang="de-CH"/>
-          </a:p>
-        </p:txBody>
-      </p:sp>
-      <p:sp>
-        <p:nvSpPr>
-          <p:cNvPr id="4" name="Inhaltsplatzhalter 3"/>
-          <p:cNvSpPr>
-            <a:spLocks noGrp="1"/>
-          </p:cNvSpPr>
-          <p:nvPr>
-            <p:ph sz="half" idx="13"/>
-          </p:nvPr>
-        </p:nvSpPr>
-        <p:spPr/>
-        <p:txBody>
-          <a:bodyPr/>
-          <a:lstStyle/>
-          <a:p>
-            <a:endParaRPr lang="de-CH"/>
-          </a:p>
-        </p:txBody>
-      </p:sp>
-    </p:spTree>
-    <p:extLst>
-      <p:ext uri="{BB962C8B-B14F-4D97-AF65-F5344CB8AC3E}">
-        <p14:creationId xmlns:p14="http://schemas.microsoft.com/office/powerpoint/2010/main" val="153582886"/>
       </p:ext>
     </p:extLst>
   </p:cSld>
@@ -8052,9 +8380,38 @@
           <a:chExt cx="0" cy="0"/>
         </a:xfrm>
       </p:grpSpPr>
-      <p:sp>
-        <p:nvSpPr>
-          <p:cNvPr id="5" name="Titel 4"/>
+      <p:pic>
+        <p:nvPicPr>
+          <p:cNvPr id="4" name="Inhaltsplatzhalter 3"/>
+          <p:cNvPicPr>
+            <a:picLocks noGrp="1" noChangeAspect="1"/>
+          </p:cNvPicPr>
+          <p:nvPr>
+            <p:ph sz="half" idx="1"/>
+          </p:nvPr>
+        </p:nvPicPr>
+        <p:blipFill>
+          <a:blip r:embed="rId3">
+            <a:extLst>
+              <a:ext uri="{28A0092B-C50C-407E-A947-70E740481C1C}">
+                <a14:useLocalDpi xmlns:a14="http://schemas.microsoft.com/office/drawing/2010/main" val="0"/>
+              </a:ext>
+            </a:extLst>
+          </a:blip>
+          <a:stretch>
+            <a:fillRect/>
+          </a:stretch>
+        </p:blipFill>
+        <p:spPr>
+          <a:xfrm>
+            <a:off x="1098484" y="1439863"/>
+            <a:ext cx="6839083" cy="4679950"/>
+          </a:xfrm>
+        </p:spPr>
+      </p:pic>
+      <p:sp>
+        <p:nvSpPr>
+          <p:cNvPr id="3" name="Titel 2"/>
           <p:cNvSpPr>
             <a:spLocks noGrp="1"/>
           </p:cNvSpPr>
@@ -8068,644 +8425,21 @@
           <a:lstStyle/>
           <a:p>
             <a:r>
-              <a:rPr lang="de-CH" dirty="0" smtClean="0"/>
+              <a:rPr lang="de-CH" dirty="0"/>
               <a:t>Ausgangslage </a:t>
             </a:r>
             <a:r>
-              <a:rPr lang="de-CH" dirty="0" err="1" smtClean="0"/>
+              <a:rPr lang="de-CH" dirty="0" err="1"/>
               <a:t>Prototyping</a:t>
             </a:r>
             <a:endParaRPr lang="de-CH" dirty="0"/>
-          </a:p>
-        </p:txBody>
-      </p:sp>
-      <p:sp>
-        <p:nvSpPr>
-          <p:cNvPr id="6" name="Untertitel 5"/>
-          <p:cNvSpPr>
-            <a:spLocks noGrp="1"/>
-          </p:cNvSpPr>
-          <p:nvPr>
-            <p:ph type="subTitle" idx="1"/>
-          </p:nvPr>
-        </p:nvSpPr>
-        <p:spPr/>
-        <p:txBody>
-          <a:bodyPr/>
-          <a:lstStyle/>
-          <a:p>
-            <a:endParaRPr lang="de-CH"/>
           </a:p>
         </p:txBody>
       </p:sp>
     </p:spTree>
     <p:extLst>
       <p:ext uri="{BB962C8B-B14F-4D97-AF65-F5344CB8AC3E}">
-        <p14:creationId xmlns:p14="http://schemas.microsoft.com/office/powerpoint/2010/main" val="3399875752"/>
-      </p:ext>
-    </p:extLst>
-  </p:cSld>
-  <p:clrMapOvr>
-    <a:masterClrMapping/>
-  </p:clrMapOvr>
-  <p:timing>
-    <p:tnLst>
-      <p:par>
-        <p:cTn id="1" dur="indefinite" restart="never" nodeType="tmRoot"/>
-      </p:par>
-    </p:tnLst>
-  </p:timing>
-</p:sld>
-</file>
-
-<file path=ppt/slides/slide20.xml><?xml version="1.0" encoding="utf-8"?>
-<p:sld xmlns:a="http://schemas.openxmlformats.org/drawingml/2006/main" xmlns:r="http://schemas.openxmlformats.org/officeDocument/2006/relationships" xmlns:p="http://schemas.openxmlformats.org/presentationml/2006/main">
-  <p:cSld>
-    <p:spTree>
-      <p:nvGrpSpPr>
-        <p:cNvPr id="1" name=""/>
-        <p:cNvGrpSpPr/>
-        <p:nvPr/>
-      </p:nvGrpSpPr>
-      <p:grpSpPr>
-        <a:xfrm>
-          <a:off x="0" y="0"/>
-          <a:ext cx="0" cy="0"/>
-          <a:chOff x="0" y="0"/>
-          <a:chExt cx="0" cy="0"/>
-        </a:xfrm>
-      </p:grpSpPr>
-      <p:sp>
-        <p:nvSpPr>
-          <p:cNvPr id="7" name="Titel 6"/>
-          <p:cNvSpPr>
-            <a:spLocks noGrp="1"/>
-          </p:cNvSpPr>
-          <p:nvPr>
-            <p:ph type="ctrTitle"/>
-          </p:nvPr>
-        </p:nvSpPr>
-        <p:spPr/>
-        <p:txBody>
-          <a:bodyPr/>
-          <a:lstStyle/>
-          <a:p>
-            <a:endParaRPr lang="de-CH"/>
-          </a:p>
-        </p:txBody>
-      </p:sp>
-      <p:sp>
-        <p:nvSpPr>
-          <p:cNvPr id="8" name="Textplatzhalter 7"/>
-          <p:cNvSpPr>
-            <a:spLocks noGrp="1"/>
-          </p:cNvSpPr>
-          <p:nvPr>
-            <p:ph type="body" idx="1"/>
-          </p:nvPr>
-        </p:nvSpPr>
-        <p:spPr/>
-        <p:txBody>
-          <a:bodyPr/>
-          <a:lstStyle/>
-          <a:p>
-            <a:endParaRPr lang="de-CH"/>
-          </a:p>
-        </p:txBody>
-      </p:sp>
-      <p:sp>
-        <p:nvSpPr>
-          <p:cNvPr id="11" name="Textplatzhalter 10"/>
-          <p:cNvSpPr>
-            <a:spLocks noGrp="1"/>
-          </p:cNvSpPr>
-          <p:nvPr>
-            <p:ph type="body" idx="18"/>
-          </p:nvPr>
-        </p:nvSpPr>
-        <p:spPr/>
-        <p:txBody>
-          <a:bodyPr/>
-          <a:lstStyle/>
-          <a:p>
-            <a:endParaRPr lang="de-CH"/>
-          </a:p>
-        </p:txBody>
-      </p:sp>
-      <p:sp>
-        <p:nvSpPr>
-          <p:cNvPr id="9" name="Inhaltsplatzhalter 8"/>
-          <p:cNvSpPr>
-            <a:spLocks noGrp="1"/>
-          </p:cNvSpPr>
-          <p:nvPr>
-            <p:ph sz="half" idx="13"/>
-          </p:nvPr>
-        </p:nvSpPr>
-        <p:spPr/>
-        <p:txBody>
-          <a:bodyPr/>
-          <a:lstStyle/>
-          <a:p>
-            <a:endParaRPr lang="de-CH"/>
-          </a:p>
-        </p:txBody>
-      </p:sp>
-      <p:sp>
-        <p:nvSpPr>
-          <p:cNvPr id="10" name="Inhaltsplatzhalter 9"/>
-          <p:cNvSpPr>
-            <a:spLocks noGrp="1"/>
-          </p:cNvSpPr>
-          <p:nvPr>
-            <p:ph sz="half" idx="15"/>
-          </p:nvPr>
-        </p:nvSpPr>
-        <p:spPr/>
-        <p:txBody>
-          <a:bodyPr/>
-          <a:lstStyle/>
-          <a:p>
-            <a:endParaRPr lang="de-CH"/>
-          </a:p>
-        </p:txBody>
-      </p:sp>
-    </p:spTree>
-    <p:extLst>
-      <p:ext uri="{BB962C8B-B14F-4D97-AF65-F5344CB8AC3E}">
-        <p14:creationId xmlns:p14="http://schemas.microsoft.com/office/powerpoint/2010/main" val="1673217479"/>
-      </p:ext>
-    </p:extLst>
-  </p:cSld>
-  <p:clrMapOvr>
-    <a:masterClrMapping/>
-  </p:clrMapOvr>
-  <p:timing>
-    <p:tnLst>
-      <p:par>
-        <p:cTn id="1" dur="indefinite" restart="never" nodeType="tmRoot"/>
-      </p:par>
-    </p:tnLst>
-  </p:timing>
-</p:sld>
-</file>
-
-<file path=ppt/slides/slide21.xml><?xml version="1.0" encoding="utf-8"?>
-<p:sld xmlns:a="http://schemas.openxmlformats.org/drawingml/2006/main" xmlns:r="http://schemas.openxmlformats.org/officeDocument/2006/relationships" xmlns:p="http://schemas.openxmlformats.org/presentationml/2006/main">
-  <p:cSld>
-    <p:spTree>
-      <p:nvGrpSpPr>
-        <p:cNvPr id="1" name=""/>
-        <p:cNvGrpSpPr/>
-        <p:nvPr/>
-      </p:nvGrpSpPr>
-      <p:grpSpPr>
-        <a:xfrm>
-          <a:off x="0" y="0"/>
-          <a:ext cx="0" cy="0"/>
-          <a:chOff x="0" y="0"/>
-          <a:chExt cx="0" cy="0"/>
-        </a:xfrm>
-      </p:grpSpPr>
-      <p:sp>
-        <p:nvSpPr>
-          <p:cNvPr id="2" name="Titel 1"/>
-          <p:cNvSpPr>
-            <a:spLocks noGrp="1"/>
-          </p:cNvSpPr>
-          <p:nvPr>
-            <p:ph type="ctrTitle"/>
-          </p:nvPr>
-        </p:nvSpPr>
-        <p:spPr/>
-        <p:txBody>
-          <a:bodyPr/>
-          <a:lstStyle/>
-          <a:p>
-            <a:endParaRPr lang="de-CH"/>
-          </a:p>
-        </p:txBody>
-      </p:sp>
-      <p:sp>
-        <p:nvSpPr>
-          <p:cNvPr id="3" name="Textplatzhalter 2"/>
-          <p:cNvSpPr>
-            <a:spLocks noGrp="1"/>
-          </p:cNvSpPr>
-          <p:nvPr>
-            <p:ph type="body" idx="1"/>
-          </p:nvPr>
-        </p:nvSpPr>
-        <p:spPr/>
-        <p:txBody>
-          <a:bodyPr/>
-          <a:lstStyle/>
-          <a:p>
-            <a:endParaRPr lang="de-CH"/>
-          </a:p>
-        </p:txBody>
-      </p:sp>
-      <p:sp>
-        <p:nvSpPr>
-          <p:cNvPr id="4" name="Inhaltsplatzhalter 3"/>
-          <p:cNvSpPr>
-            <a:spLocks noGrp="1"/>
-          </p:cNvSpPr>
-          <p:nvPr>
-            <p:ph sz="half" idx="13"/>
-          </p:nvPr>
-        </p:nvSpPr>
-        <p:spPr/>
-        <p:txBody>
-          <a:bodyPr/>
-          <a:lstStyle/>
-          <a:p>
-            <a:endParaRPr lang="de-CH"/>
-          </a:p>
-        </p:txBody>
-      </p:sp>
-      <p:sp>
-        <p:nvSpPr>
-          <p:cNvPr id="5" name="Textplatzhalter 4"/>
-          <p:cNvSpPr>
-            <a:spLocks noGrp="1"/>
-          </p:cNvSpPr>
-          <p:nvPr>
-            <p:ph type="body" idx="14"/>
-          </p:nvPr>
-        </p:nvSpPr>
-        <p:spPr/>
-        <p:txBody>
-          <a:bodyPr/>
-          <a:lstStyle/>
-          <a:p>
-            <a:endParaRPr lang="de-CH"/>
-          </a:p>
-        </p:txBody>
-      </p:sp>
-      <p:sp>
-        <p:nvSpPr>
-          <p:cNvPr id="6" name="Inhaltsplatzhalter 5"/>
-          <p:cNvSpPr>
-            <a:spLocks noGrp="1"/>
-          </p:cNvSpPr>
-          <p:nvPr>
-            <p:ph sz="half" idx="15"/>
-          </p:nvPr>
-        </p:nvSpPr>
-        <p:spPr/>
-        <p:txBody>
-          <a:bodyPr/>
-          <a:lstStyle/>
-          <a:p>
-            <a:endParaRPr lang="de-CH"/>
-          </a:p>
-        </p:txBody>
-      </p:sp>
-    </p:spTree>
-    <p:extLst>
-      <p:ext uri="{BB962C8B-B14F-4D97-AF65-F5344CB8AC3E}">
-        <p14:creationId xmlns:p14="http://schemas.microsoft.com/office/powerpoint/2010/main" val="1872521376"/>
-      </p:ext>
-    </p:extLst>
-  </p:cSld>
-  <p:clrMapOvr>
-    <a:masterClrMapping/>
-  </p:clrMapOvr>
-  <p:timing>
-    <p:tnLst>
-      <p:par>
-        <p:cTn id="1" dur="indefinite" restart="never" nodeType="tmRoot"/>
-      </p:par>
-    </p:tnLst>
-  </p:timing>
-</p:sld>
-</file>
-
-<file path=ppt/slides/slide22.xml><?xml version="1.0" encoding="utf-8"?>
-<p:sld xmlns:a="http://schemas.openxmlformats.org/drawingml/2006/main" xmlns:r="http://schemas.openxmlformats.org/officeDocument/2006/relationships" xmlns:p="http://schemas.openxmlformats.org/presentationml/2006/main">
-  <p:cSld>
-    <p:spTree>
-      <p:nvGrpSpPr>
-        <p:cNvPr id="1" name=""/>
-        <p:cNvGrpSpPr/>
-        <p:nvPr/>
-      </p:nvGrpSpPr>
-      <p:grpSpPr>
-        <a:xfrm>
-          <a:off x="0" y="0"/>
-          <a:ext cx="0" cy="0"/>
-          <a:chOff x="0" y="0"/>
-          <a:chExt cx="0" cy="0"/>
-        </a:xfrm>
-      </p:grpSpPr>
-      <p:sp>
-        <p:nvSpPr>
-          <p:cNvPr id="2" name="Titel 1"/>
-          <p:cNvSpPr>
-            <a:spLocks noGrp="1"/>
-          </p:cNvSpPr>
-          <p:nvPr>
-            <p:ph type="ctrTitle"/>
-          </p:nvPr>
-        </p:nvSpPr>
-        <p:spPr/>
-        <p:txBody>
-          <a:bodyPr/>
-          <a:lstStyle/>
-          <a:p>
-            <a:endParaRPr lang="de-CH"/>
-          </a:p>
-        </p:txBody>
-      </p:sp>
-      <p:sp>
-        <p:nvSpPr>
-          <p:cNvPr id="3" name="Textplatzhalter 2"/>
-          <p:cNvSpPr>
-            <a:spLocks noGrp="1"/>
-          </p:cNvSpPr>
-          <p:nvPr>
-            <p:ph type="body" idx="1"/>
-          </p:nvPr>
-        </p:nvSpPr>
-        <p:spPr/>
-        <p:txBody>
-          <a:bodyPr/>
-          <a:lstStyle/>
-          <a:p>
-            <a:endParaRPr lang="de-CH"/>
-          </a:p>
-        </p:txBody>
-      </p:sp>
-      <p:sp>
-        <p:nvSpPr>
-          <p:cNvPr id="4" name="Textplatzhalter 3"/>
-          <p:cNvSpPr>
-            <a:spLocks noGrp="1"/>
-          </p:cNvSpPr>
-          <p:nvPr>
-            <p:ph type="body" idx="18"/>
-          </p:nvPr>
-        </p:nvSpPr>
-        <p:spPr/>
-        <p:txBody>
-          <a:bodyPr/>
-          <a:lstStyle/>
-          <a:p>
-            <a:endParaRPr lang="de-CH"/>
-          </a:p>
-        </p:txBody>
-      </p:sp>
-      <p:sp>
-        <p:nvSpPr>
-          <p:cNvPr id="5" name="Inhaltsplatzhalter 4"/>
-          <p:cNvSpPr>
-            <a:spLocks noGrp="1"/>
-          </p:cNvSpPr>
-          <p:nvPr>
-            <p:ph sz="half" idx="13"/>
-          </p:nvPr>
-        </p:nvSpPr>
-        <p:spPr/>
-        <p:txBody>
-          <a:bodyPr/>
-          <a:lstStyle/>
-          <a:p>
-            <a:endParaRPr lang="de-CH"/>
-          </a:p>
-        </p:txBody>
-      </p:sp>
-      <p:sp>
-        <p:nvSpPr>
-          <p:cNvPr id="6" name="Inhaltsplatzhalter 5"/>
-          <p:cNvSpPr>
-            <a:spLocks noGrp="1"/>
-          </p:cNvSpPr>
-          <p:nvPr>
-            <p:ph sz="half" idx="15"/>
-          </p:nvPr>
-        </p:nvSpPr>
-        <p:spPr/>
-        <p:txBody>
-          <a:bodyPr/>
-          <a:lstStyle/>
-          <a:p>
-            <a:endParaRPr lang="de-CH"/>
-          </a:p>
-        </p:txBody>
-      </p:sp>
-      <p:sp>
-        <p:nvSpPr>
-          <p:cNvPr id="7" name="Inhaltsplatzhalter 6"/>
-          <p:cNvSpPr>
-            <a:spLocks noGrp="1"/>
-          </p:cNvSpPr>
-          <p:nvPr>
-            <p:ph sz="half" idx="19"/>
-          </p:nvPr>
-        </p:nvSpPr>
-        <p:spPr/>
-        <p:txBody>
-          <a:bodyPr/>
-          <a:lstStyle/>
-          <a:p>
-            <a:endParaRPr lang="de-CH"/>
-          </a:p>
-        </p:txBody>
-      </p:sp>
-      <p:sp>
-        <p:nvSpPr>
-          <p:cNvPr id="8" name="Textplatzhalter 7"/>
-          <p:cNvSpPr>
-            <a:spLocks noGrp="1"/>
-          </p:cNvSpPr>
-          <p:nvPr>
-            <p:ph type="body" idx="20"/>
-          </p:nvPr>
-        </p:nvSpPr>
-        <p:spPr/>
-        <p:txBody>
-          <a:bodyPr/>
-          <a:lstStyle/>
-          <a:p>
-            <a:endParaRPr lang="de-CH"/>
-          </a:p>
-        </p:txBody>
-      </p:sp>
-    </p:spTree>
-    <p:extLst>
-      <p:ext uri="{BB962C8B-B14F-4D97-AF65-F5344CB8AC3E}">
-        <p14:creationId xmlns:p14="http://schemas.microsoft.com/office/powerpoint/2010/main" val="3225023463"/>
-      </p:ext>
-    </p:extLst>
-  </p:cSld>
-  <p:clrMapOvr>
-    <a:masterClrMapping/>
-  </p:clrMapOvr>
-  <p:timing>
-    <p:tnLst>
-      <p:par>
-        <p:cTn id="1" dur="indefinite" restart="never" nodeType="tmRoot"/>
-      </p:par>
-    </p:tnLst>
-  </p:timing>
-</p:sld>
-</file>
-
-<file path=ppt/slides/slide23.xml><?xml version="1.0" encoding="utf-8"?>
-<p:sld xmlns:a="http://schemas.openxmlformats.org/drawingml/2006/main" xmlns:r="http://schemas.openxmlformats.org/officeDocument/2006/relationships" xmlns:p="http://schemas.openxmlformats.org/presentationml/2006/main">
-  <p:cSld>
-    <p:spTree>
-      <p:nvGrpSpPr>
-        <p:cNvPr id="1" name=""/>
-        <p:cNvGrpSpPr/>
-        <p:nvPr/>
-      </p:nvGrpSpPr>
-      <p:grpSpPr>
-        <a:xfrm>
-          <a:off x="0" y="0"/>
-          <a:ext cx="0" cy="0"/>
-          <a:chOff x="0" y="0"/>
-          <a:chExt cx="0" cy="0"/>
-        </a:xfrm>
-      </p:grpSpPr>
-      <p:sp>
-        <p:nvSpPr>
-          <p:cNvPr id="2" name="Titel 1"/>
-          <p:cNvSpPr>
-            <a:spLocks noGrp="1"/>
-          </p:cNvSpPr>
-          <p:nvPr>
-            <p:ph type="ctrTitle"/>
-          </p:nvPr>
-        </p:nvSpPr>
-        <p:spPr/>
-        <p:txBody>
-          <a:bodyPr/>
-          <a:lstStyle/>
-          <a:p>
-            <a:endParaRPr lang="de-CH"/>
-          </a:p>
-        </p:txBody>
-      </p:sp>
-      <p:sp>
-        <p:nvSpPr>
-          <p:cNvPr id="3" name="Inhaltsplatzhalter 2"/>
-          <p:cNvSpPr>
-            <a:spLocks noGrp="1"/>
-          </p:cNvSpPr>
-          <p:nvPr>
-            <p:ph sz="half" idx="13"/>
-          </p:nvPr>
-        </p:nvSpPr>
-        <p:spPr/>
-        <p:txBody>
-          <a:bodyPr/>
-          <a:lstStyle/>
-          <a:p>
-            <a:endParaRPr lang="de-CH"/>
-          </a:p>
-        </p:txBody>
-      </p:sp>
-      <p:sp>
-        <p:nvSpPr>
-          <p:cNvPr id="4" name="Inhaltsplatzhalter 3"/>
-          <p:cNvSpPr>
-            <a:spLocks noGrp="1"/>
-          </p:cNvSpPr>
-          <p:nvPr>
-            <p:ph sz="half" idx="15"/>
-          </p:nvPr>
-        </p:nvSpPr>
-        <p:spPr/>
-        <p:txBody>
-          <a:bodyPr/>
-          <a:lstStyle/>
-          <a:p>
-            <a:endParaRPr lang="de-CH"/>
-          </a:p>
-        </p:txBody>
-      </p:sp>
-      <p:sp>
-        <p:nvSpPr>
-          <p:cNvPr id="5" name="Inhaltsplatzhalter 4"/>
-          <p:cNvSpPr>
-            <a:spLocks noGrp="1"/>
-          </p:cNvSpPr>
-          <p:nvPr>
-            <p:ph sz="half" idx="19"/>
-          </p:nvPr>
-        </p:nvSpPr>
-        <p:spPr/>
-        <p:txBody>
-          <a:bodyPr/>
-          <a:lstStyle/>
-          <a:p>
-            <a:endParaRPr lang="de-CH"/>
-          </a:p>
-        </p:txBody>
-      </p:sp>
-      <p:sp>
-        <p:nvSpPr>
-          <p:cNvPr id="6" name="Textplatzhalter 5"/>
-          <p:cNvSpPr>
-            <a:spLocks noGrp="1"/>
-          </p:cNvSpPr>
-          <p:nvPr>
-            <p:ph type="body" idx="1"/>
-          </p:nvPr>
-        </p:nvSpPr>
-        <p:spPr/>
-        <p:txBody>
-          <a:bodyPr/>
-          <a:lstStyle/>
-          <a:p>
-            <a:endParaRPr lang="de-CH"/>
-          </a:p>
-        </p:txBody>
-      </p:sp>
-      <p:sp>
-        <p:nvSpPr>
-          <p:cNvPr id="7" name="Textplatzhalter 6"/>
-          <p:cNvSpPr>
-            <a:spLocks noGrp="1"/>
-          </p:cNvSpPr>
-          <p:nvPr>
-            <p:ph type="body" idx="18"/>
-          </p:nvPr>
-        </p:nvSpPr>
-        <p:spPr/>
-        <p:txBody>
-          <a:bodyPr/>
-          <a:lstStyle/>
-          <a:p>
-            <a:endParaRPr lang="de-CH"/>
-          </a:p>
-        </p:txBody>
-      </p:sp>
-      <p:sp>
-        <p:nvSpPr>
-          <p:cNvPr id="8" name="Textplatzhalter 7"/>
-          <p:cNvSpPr>
-            <a:spLocks noGrp="1"/>
-          </p:cNvSpPr>
-          <p:nvPr>
-            <p:ph type="body" idx="20"/>
-          </p:nvPr>
-        </p:nvSpPr>
-        <p:spPr/>
-        <p:txBody>
-          <a:bodyPr/>
-          <a:lstStyle/>
-          <a:p>
-            <a:endParaRPr lang="de-CH"/>
-          </a:p>
-        </p:txBody>
-      </p:sp>
-    </p:spTree>
-    <p:extLst>
-      <p:ext uri="{BB962C8B-B14F-4D97-AF65-F5344CB8AC3E}">
-        <p14:creationId xmlns:p14="http://schemas.microsoft.com/office/powerpoint/2010/main" val="1501259291"/>
+        <p14:creationId xmlns:p14="http://schemas.microsoft.com/office/powerpoint/2010/main" val="2478133306"/>
       </p:ext>
     </p:extLst>
   </p:cSld>
@@ -8739,99 +8473,6 @@
           <a:chExt cx="0" cy="0"/>
         </a:xfrm>
       </p:grpSpPr>
-      <p:pic>
-        <p:nvPicPr>
-          <p:cNvPr id="4" name="Inhaltsplatzhalter 3"/>
-          <p:cNvPicPr>
-            <a:picLocks noGrp="1" noChangeAspect="1"/>
-          </p:cNvPicPr>
-          <p:nvPr>
-            <p:ph sz="half" idx="1"/>
-          </p:nvPr>
-        </p:nvPicPr>
-        <p:blipFill>
-          <a:blip r:embed="rId2">
-            <a:extLst>
-              <a:ext uri="{28A0092B-C50C-407E-A947-70E740481C1C}">
-                <a14:useLocalDpi xmlns:a14="http://schemas.microsoft.com/office/drawing/2010/main" val="0"/>
-              </a:ext>
-            </a:extLst>
-          </a:blip>
-          <a:stretch>
-            <a:fillRect/>
-          </a:stretch>
-        </p:blipFill>
-        <p:spPr>
-          <a:xfrm>
-            <a:off x="1098484" y="1439863"/>
-            <a:ext cx="6839083" cy="4679950"/>
-          </a:xfrm>
-        </p:spPr>
-      </p:pic>
-      <p:sp>
-        <p:nvSpPr>
-          <p:cNvPr id="3" name="Titel 2"/>
-          <p:cNvSpPr>
-            <a:spLocks noGrp="1"/>
-          </p:cNvSpPr>
-          <p:nvPr>
-            <p:ph type="ctrTitle"/>
-          </p:nvPr>
-        </p:nvSpPr>
-        <p:spPr/>
-        <p:txBody>
-          <a:bodyPr/>
-          <a:lstStyle/>
-          <a:p>
-            <a:r>
-              <a:rPr lang="de-CH" dirty="0"/>
-              <a:t>Ausgangslage </a:t>
-            </a:r>
-            <a:r>
-              <a:rPr lang="de-CH" dirty="0" err="1"/>
-              <a:t>Prototyping</a:t>
-            </a:r>
-            <a:endParaRPr lang="de-CH" dirty="0"/>
-          </a:p>
-        </p:txBody>
-      </p:sp>
-    </p:spTree>
-    <p:extLst>
-      <p:ext uri="{BB962C8B-B14F-4D97-AF65-F5344CB8AC3E}">
-        <p14:creationId xmlns:p14="http://schemas.microsoft.com/office/powerpoint/2010/main" val="2478133306"/>
-      </p:ext>
-    </p:extLst>
-  </p:cSld>
-  <p:clrMapOvr>
-    <a:masterClrMapping/>
-  </p:clrMapOvr>
-  <p:timing>
-    <p:tnLst>
-      <p:par>
-        <p:cTn id="1" dur="indefinite" restart="never" nodeType="tmRoot"/>
-      </p:par>
-    </p:tnLst>
-  </p:timing>
-</p:sld>
-</file>
-
-<file path=ppt/slides/slide4.xml><?xml version="1.0" encoding="utf-8"?>
-<p:sld xmlns:a="http://schemas.openxmlformats.org/drawingml/2006/main" xmlns:r="http://schemas.openxmlformats.org/officeDocument/2006/relationships" xmlns:p="http://schemas.openxmlformats.org/presentationml/2006/main">
-  <p:cSld>
-    <p:spTree>
-      <p:nvGrpSpPr>
-        <p:cNvPr id="1" name=""/>
-        <p:cNvGrpSpPr/>
-        <p:nvPr/>
-      </p:nvGrpSpPr>
-      <p:grpSpPr>
-        <a:xfrm>
-          <a:off x="0" y="0"/>
-          <a:ext cx="0" cy="0"/>
-          <a:chOff x="0" y="0"/>
-          <a:chExt cx="0" cy="0"/>
-        </a:xfrm>
-      </p:grpSpPr>
       <p:sp>
         <p:nvSpPr>
           <p:cNvPr id="7" name="Titel 6"/>
@@ -8869,14 +8510,14 @@
             <p:ph sz="half" idx="13"/>
             <p:extLst>
               <p:ext uri="{D42A27DB-BD31-4B8C-83A1-F6EECF244321}">
-                <p14:modId xmlns:p14="http://schemas.microsoft.com/office/powerpoint/2010/main" val="1714306740"/>
+                <p14:modId xmlns:p14="http://schemas.microsoft.com/office/powerpoint/2010/main" val="2652461868"/>
               </p:ext>
             </p:extLst>
           </p:nvPr>
         </p:nvGraphicFramePr>
         <p:xfrm>
           <a:off x="468313" y="1980000"/>
-          <a:ext cx="3959225" cy="2225040"/>
+          <a:ext cx="3959225" cy="2494280"/>
         </p:xfrm>
         <a:graphic>
           <a:graphicData uri="http://schemas.openxmlformats.org/drawingml/2006/table">
@@ -8944,8 +8585,9 @@
                       </a:pPr>
                       <a:r>
                         <a:rPr lang="de-CH" dirty="0" smtClean="0"/>
-                        <a:t>Abgleich Daten auf 1 Client</a:t>
+                        <a:t>Keine Netzwerk-Einschränkungen</a:t>
                       </a:r>
+                      <a:endParaRPr lang="de-CH" dirty="0" smtClean="0"/>
                     </a:p>
                   </a:txBody>
                   <a:tcPr/>
@@ -9362,7 +9004,7 @@
           <p:nvPr/>
         </p:nvPicPr>
         <p:blipFill>
-          <a:blip r:embed="rId2">
+          <a:blip r:embed="rId3">
             <a:extLst>
               <a:ext uri="{28A0092B-C50C-407E-A947-70E740481C1C}">
                 <a14:useLocalDpi xmlns:a14="http://schemas.microsoft.com/office/drawing/2010/main" val="0"/>
@@ -9392,7 +9034,7 @@
           <p:nvPr/>
         </p:nvPicPr>
         <p:blipFill>
-          <a:blip r:embed="rId3">
+          <a:blip r:embed="rId4">
             <a:extLst>
               <a:ext uri="{28A0092B-C50C-407E-A947-70E740481C1C}">
                 <a14:useLocalDpi xmlns:a14="http://schemas.microsoft.com/office/drawing/2010/main" val="0"/>
@@ -9433,7 +9075,7 @@
 </p:sld>
 </file>
 
-<file path=ppt/slides/slide5.xml><?xml version="1.0" encoding="utf-8"?>
+<file path=ppt/slides/slide4.xml><?xml version="1.0" encoding="utf-8"?>
 <p:sld xmlns:a="http://schemas.openxmlformats.org/drawingml/2006/main" xmlns:r="http://schemas.openxmlformats.org/officeDocument/2006/relationships" xmlns:p="http://schemas.openxmlformats.org/presentationml/2006/main">
   <p:cSld>
     <p:spTree>
@@ -9614,7 +9256,7 @@
         </p:nvGraphicFramePr>
         <p:xfrm>
           <a:off x="4589463" y="1980000"/>
-          <a:ext cx="4051300" cy="2225040"/>
+          <a:ext cx="4051300" cy="2494280"/>
         </p:xfrm>
         <a:graphic>
           <a:graphicData uri="http://schemas.openxmlformats.org/drawingml/2006/table">
@@ -9985,7 +9627,7 @@
 </p:sld>
 </file>
 
-<file path=ppt/slides/slide6.xml><?xml version="1.0" encoding="utf-8"?>
+<file path=ppt/slides/slide5.xml><?xml version="1.0" encoding="utf-8"?>
 <p:sld xmlns:a="http://schemas.openxmlformats.org/drawingml/2006/main" xmlns:r="http://schemas.openxmlformats.org/officeDocument/2006/relationships" xmlns:p="http://schemas.openxmlformats.org/presentationml/2006/main">
   <p:cSld>
     <p:spTree>
@@ -10046,7 +9688,7 @@
         </p:nvGraphicFramePr>
         <p:xfrm>
           <a:off x="468313" y="1980000"/>
-          <a:ext cx="3959225" cy="2225040"/>
+          <a:ext cx="3959225" cy="2494280"/>
         </p:xfrm>
         <a:graphic>
           <a:graphicData uri="http://schemas.openxmlformats.org/drawingml/2006/table">
@@ -10176,7 +9818,7 @@
             <p:ph sz="half" idx="15"/>
             <p:extLst>
               <p:ext uri="{D42A27DB-BD31-4B8C-83A1-F6EECF244321}">
-                <p14:modId xmlns:p14="http://schemas.microsoft.com/office/powerpoint/2010/main" val="2434746327"/>
+                <p14:modId xmlns:p14="http://schemas.microsoft.com/office/powerpoint/2010/main" val="4219645779"/>
               </p:ext>
             </p:extLst>
           </p:nvPr>
@@ -10250,7 +9892,19 @@
                       </a:pPr>
                       <a:r>
                         <a:rPr lang="de-CH" dirty="0" smtClean="0"/>
-                        <a:t>Relativ teure Infrastruktur</a:t>
+                        <a:t>Anschaffung</a:t>
+                      </a:r>
+                      <a:r>
+                        <a:rPr lang="de-CH" baseline="0" dirty="0" smtClean="0"/>
+                        <a:t> </a:t>
+                      </a:r>
+                      <a:r>
+                        <a:rPr lang="de-CH" baseline="0" dirty="0" err="1" smtClean="0"/>
+                        <a:t>Quadro</a:t>
+                      </a:r>
+                      <a:r>
+                        <a:rPr lang="de-CH" baseline="0" dirty="0" smtClean="0"/>
+                        <a:t> Karten</a:t>
                       </a:r>
                       <a:endParaRPr lang="de-CH" dirty="0"/>
                     </a:p>
@@ -10596,7 +10250,7 @@
 </p:sld>
 </file>
 
-<file path=ppt/slides/slide7.xml><?xml version="1.0" encoding="utf-8"?>
+<file path=ppt/slides/slide6.xml><?xml version="1.0" encoding="utf-8"?>
 <p:sld xmlns:a="http://schemas.openxmlformats.org/drawingml/2006/main" xmlns:r="http://schemas.openxmlformats.org/officeDocument/2006/relationships" xmlns:p="http://schemas.openxmlformats.org/presentationml/2006/main">
   <p:cSld>
     <p:spTree>
@@ -10650,7 +10304,7 @@
             <p:ph sz="half" idx="13"/>
             <p:extLst>
               <p:ext uri="{D42A27DB-BD31-4B8C-83A1-F6EECF244321}">
-                <p14:modId xmlns:p14="http://schemas.microsoft.com/office/powerpoint/2010/main" val="1228388479"/>
+                <p14:modId xmlns:p14="http://schemas.microsoft.com/office/powerpoint/2010/main" val="4042805060"/>
               </p:ext>
             </p:extLst>
           </p:nvPr>
@@ -10723,10 +10377,7 @@
                         <a:tabLst/>
                         <a:defRPr/>
                       </a:pPr>
-                      <a:r>
-                        <a:rPr lang="de-CH" dirty="0" smtClean="0"/>
-                        <a:t>Günstig</a:t>
-                      </a:r>
+                      <a:endParaRPr lang="de-CH" dirty="0" smtClean="0"/>
                     </a:p>
                   </a:txBody>
                   <a:tcPr/>
@@ -10782,14 +10433,14 @@
             <p:ph sz="half" idx="15"/>
             <p:extLst>
               <p:ext uri="{D42A27DB-BD31-4B8C-83A1-F6EECF244321}">
-                <p14:modId xmlns:p14="http://schemas.microsoft.com/office/powerpoint/2010/main" val="529854160"/>
+                <p14:modId xmlns:p14="http://schemas.microsoft.com/office/powerpoint/2010/main" val="9728132"/>
               </p:ext>
             </p:extLst>
           </p:nvPr>
         </p:nvGraphicFramePr>
         <p:xfrm>
           <a:off x="4589463" y="1980000"/>
-          <a:ext cx="4051300" cy="2225040"/>
+          <a:ext cx="4051300" cy="2494280"/>
         </p:xfrm>
         <a:graphic>
           <a:graphicData uri="http://schemas.openxmlformats.org/drawingml/2006/table">
@@ -10889,8 +10540,13 @@
                       </a:pPr>
                       <a:r>
                         <a:rPr lang="de-CH" dirty="0" smtClean="0"/>
-                        <a:t>Keine native Fullscreen Funkt.</a:t>
+                        <a:t>Keine native Fullscreen </a:t>
                       </a:r>
+                      <a:r>
+                        <a:rPr lang="de-CH" dirty="0" smtClean="0"/>
+                        <a:t>Funktionalität</a:t>
+                      </a:r>
+                      <a:endParaRPr lang="de-CH" dirty="0" smtClean="0"/>
                     </a:p>
                   </a:txBody>
                   <a:tcPr/>
@@ -11138,7 +10794,7 @@
           <p:nvPr/>
         </p:nvPicPr>
         <p:blipFill>
-          <a:blip r:embed="rId2">
+          <a:blip r:embed="rId3">
             <a:extLst>
               <a:ext uri="{28A0092B-C50C-407E-A947-70E740481C1C}">
                 <a14:useLocalDpi xmlns:a14="http://schemas.microsoft.com/office/drawing/2010/main" val="0"/>
@@ -11168,7 +10824,7 @@
           <p:nvPr/>
         </p:nvPicPr>
         <p:blipFill>
-          <a:blip r:embed="rId3">
+          <a:blip r:embed="rId4">
             <a:extLst>
               <a:ext uri="{28A0092B-C50C-407E-A947-70E740481C1C}">
                 <a14:useLocalDpi xmlns:a14="http://schemas.microsoft.com/office/drawing/2010/main" val="0"/>
@@ -11209,6 +10865,89 @@
 </p:sld>
 </file>
 
+<file path=ppt/slides/slide7.xml><?xml version="1.0" encoding="utf-8"?>
+<p:sld xmlns:a="http://schemas.openxmlformats.org/drawingml/2006/main" xmlns:r="http://schemas.openxmlformats.org/officeDocument/2006/relationships" xmlns:p="http://schemas.openxmlformats.org/presentationml/2006/main">
+  <p:cSld>
+    <p:spTree>
+      <p:nvGrpSpPr>
+        <p:cNvPr id="1" name=""/>
+        <p:cNvGrpSpPr/>
+        <p:nvPr/>
+      </p:nvGrpSpPr>
+      <p:grpSpPr>
+        <a:xfrm>
+          <a:off x="0" y="0"/>
+          <a:ext cx="0" cy="0"/>
+          <a:chOff x="0" y="0"/>
+          <a:chExt cx="0" cy="0"/>
+        </a:xfrm>
+      </p:grpSpPr>
+      <p:sp>
+        <p:nvSpPr>
+          <p:cNvPr id="5" name="Titel 4"/>
+          <p:cNvSpPr>
+            <a:spLocks noGrp="1"/>
+          </p:cNvSpPr>
+          <p:nvPr>
+            <p:ph type="ctrTitle"/>
+          </p:nvPr>
+        </p:nvSpPr>
+        <p:spPr/>
+        <p:txBody>
+          <a:bodyPr/>
+          <a:lstStyle/>
+          <a:p>
+            <a:r>
+              <a:rPr lang="de-CH" dirty="0" err="1" smtClean="0"/>
+              <a:t>Prototyping</a:t>
+            </a:r>
+            <a:r>
+              <a:rPr lang="de-CH" dirty="0" smtClean="0"/>
+              <a:t> im CAVE</a:t>
+            </a:r>
+            <a:endParaRPr lang="de-CH" dirty="0"/>
+          </a:p>
+        </p:txBody>
+      </p:sp>
+      <p:sp>
+        <p:nvSpPr>
+          <p:cNvPr id="6" name="Untertitel 5"/>
+          <p:cNvSpPr>
+            <a:spLocks noGrp="1"/>
+          </p:cNvSpPr>
+          <p:nvPr>
+            <p:ph type="subTitle" idx="1"/>
+          </p:nvPr>
+        </p:nvSpPr>
+        <p:spPr/>
+        <p:txBody>
+          <a:bodyPr/>
+          <a:lstStyle/>
+          <a:p>
+            <a:endParaRPr lang="de-CH"/>
+          </a:p>
+        </p:txBody>
+      </p:sp>
+    </p:spTree>
+    <p:extLst>
+      <p:ext uri="{BB962C8B-B14F-4D97-AF65-F5344CB8AC3E}">
+        <p14:creationId xmlns:p14="http://schemas.microsoft.com/office/powerpoint/2010/main" val="2267100739"/>
+      </p:ext>
+    </p:extLst>
+  </p:cSld>
+  <p:clrMapOvr>
+    <a:masterClrMapping/>
+  </p:clrMapOvr>
+  <p:timing>
+    <p:tnLst>
+      <p:par>
+        <p:cTn id="1" dur="indefinite" restart="never" nodeType="tmRoot"/>
+      </p:par>
+    </p:tnLst>
+  </p:timing>
+</p:sld>
+</file>
+
 <file path=ppt/slides/slide8.xml><?xml version="1.0" encoding="utf-8"?>
 <p:sld xmlns:a="http://schemas.openxmlformats.org/drawingml/2006/main" xmlns:r="http://schemas.openxmlformats.org/officeDocument/2006/relationships" xmlns:p="http://schemas.openxmlformats.org/presentationml/2006/main">
   <p:cSld>
@@ -11228,7 +10967,7 @@
       </p:grpSpPr>
       <p:sp>
         <p:nvSpPr>
-          <p:cNvPr id="5" name="Titel 4"/>
+          <p:cNvPr id="2" name="Titel 1"/>
           <p:cNvSpPr>
             <a:spLocks noGrp="1"/>
           </p:cNvSpPr>
@@ -11242,25 +10981,24 @@
           <a:lstStyle/>
           <a:p>
             <a:r>
-              <a:rPr lang="de-CH" dirty="0" err="1" smtClean="0"/>
+              <a:rPr lang="de-CH" dirty="0" err="1"/>
               <a:t>Prototyping</a:t>
             </a:r>
             <a:r>
-              <a:rPr lang="de-CH" dirty="0" smtClean="0"/>
+              <a:rPr lang="de-CH" dirty="0"/>
               <a:t> im CAVE</a:t>
             </a:r>
-            <a:endParaRPr lang="de-CH" dirty="0"/>
-          </a:p>
-        </p:txBody>
-      </p:sp>
-      <p:sp>
-        <p:nvSpPr>
-          <p:cNvPr id="6" name="Untertitel 5"/>
+          </a:p>
+        </p:txBody>
+      </p:sp>
+      <p:sp>
+        <p:nvSpPr>
+          <p:cNvPr id="3" name="Textplatzhalter 2"/>
           <p:cNvSpPr>
             <a:spLocks noGrp="1"/>
           </p:cNvSpPr>
           <p:nvPr>
-            <p:ph type="subTitle" idx="1"/>
+            <p:ph type="body" idx="1"/>
           </p:nvPr>
         </p:nvSpPr>
         <p:spPr/>
@@ -11268,14 +11006,75 @@
           <a:bodyPr/>
           <a:lstStyle/>
           <a:p>
-            <a:endParaRPr lang="de-CH"/>
+            <a:r>
+              <a:rPr lang="de-CH" dirty="0" smtClean="0"/>
+              <a:t>Work</a:t>
+            </a:r>
+            <a:endParaRPr lang="de-CH" dirty="0"/>
+          </a:p>
+        </p:txBody>
+      </p:sp>
+      <p:sp>
+        <p:nvSpPr>
+          <p:cNvPr id="4" name="Inhaltsplatzhalter 3"/>
+          <p:cNvSpPr>
+            <a:spLocks noGrp="1"/>
+          </p:cNvSpPr>
+          <p:nvPr>
+            <p:ph sz="half" idx="13"/>
+          </p:nvPr>
+        </p:nvSpPr>
+        <p:spPr/>
+        <p:txBody>
+          <a:bodyPr/>
+          <a:lstStyle/>
+          <a:p>
+            <a:r>
+              <a:rPr lang="de-CH" dirty="0" smtClean="0"/>
+              <a:t>4 </a:t>
+            </a:r>
+            <a:r>
+              <a:rPr lang="de-CH" dirty="0" err="1" smtClean="0"/>
+              <a:t>Beamer</a:t>
+            </a:r>
+            <a:r>
+              <a:rPr lang="de-CH" dirty="0" smtClean="0"/>
+              <a:t> im Einsatz</a:t>
+            </a:r>
+          </a:p>
+          <a:p>
+            <a:r>
+              <a:rPr lang="de-CH" dirty="0" smtClean="0"/>
+              <a:t>Clusters aufsetzen</a:t>
+            </a:r>
+          </a:p>
+          <a:p>
+            <a:r>
+              <a:rPr lang="de-CH" dirty="0" err="1" smtClean="0"/>
+              <a:t>GeForce</a:t>
+            </a:r>
+            <a:r>
+              <a:rPr lang="de-CH" dirty="0" smtClean="0"/>
+              <a:t> Client aufsetzen</a:t>
+            </a:r>
+          </a:p>
+          <a:p>
+            <a:r>
+              <a:rPr lang="de-CH" dirty="0" err="1" smtClean="0"/>
+              <a:t>Mosaic</a:t>
+            </a:r>
+            <a:r>
+              <a:rPr lang="de-CH" dirty="0" smtClean="0"/>
+              <a:t> Client aufsetzen</a:t>
+            </a:r>
+            <a:endParaRPr lang="de-CH" dirty="0"/>
           </a:p>
         </p:txBody>
       </p:sp>
     </p:spTree>
     <p:extLst>
       <p:ext uri="{BB962C8B-B14F-4D97-AF65-F5344CB8AC3E}">
-        <p14:creationId xmlns:p14="http://schemas.microsoft.com/office/powerpoint/2010/main" val="2267100739"/>
+        <p14:creationId xmlns:p14="http://schemas.microsoft.com/office/powerpoint/2010/main" val="1891937044"/>
       </p:ext>
     </p:extLst>
   </p:cSld>
@@ -11352,20 +11151,49 @@
           <a:p>
             <a:r>
               <a:rPr lang="de-CH" dirty="0" smtClean="0"/>
-              <a:t>Work</a:t>
+              <a:t>Basic</a:t>
             </a:r>
             <a:endParaRPr lang="de-CH" dirty="0"/>
           </a:p>
         </p:txBody>
       </p:sp>
-      <p:sp>
-        <p:nvSpPr>
-          <p:cNvPr id="4" name="Inhaltsplatzhalter 3"/>
+      <p:pic>
+        <p:nvPicPr>
+          <p:cNvPr id="7" name="Inhaltsplatzhalter 6"/>
+          <p:cNvPicPr>
+            <a:picLocks noGrp="1"/>
+          </p:cNvPicPr>
+          <p:nvPr>
+            <p:ph sz="half" idx="13"/>
+          </p:nvPr>
+        </p:nvPicPr>
+        <p:blipFill>
+          <a:blip r:embed="rId3">
+            <a:extLst>
+              <a:ext uri="{28A0092B-C50C-407E-A947-70E740481C1C}">
+                <a14:useLocalDpi xmlns:a14="http://schemas.microsoft.com/office/drawing/2010/main" val="0"/>
+              </a:ext>
+            </a:extLst>
+          </a:blip>
+          <a:stretch>
+            <a:fillRect/>
+          </a:stretch>
+        </p:blipFill>
+        <p:spPr>
+          <a:xfrm>
+            <a:off x="468312" y="1980000"/>
+            <a:ext cx="4050000" cy="2800800"/>
+          </a:xfrm>
+        </p:spPr>
+      </p:pic>
+      <p:sp>
+        <p:nvSpPr>
+          <p:cNvPr id="5" name="Textplatzhalter 4"/>
           <p:cNvSpPr>
             <a:spLocks noGrp="1"/>
           </p:cNvSpPr>
           <p:nvPr>
-            <p:ph sz="half" idx="13"/>
+            <p:ph type="body" idx="14"/>
           </p:nvPr>
         </p:nvSpPr>
         <p:spPr/>
@@ -11375,50 +11203,45 @@
           <a:p>
             <a:r>
               <a:rPr lang="de-CH" dirty="0" smtClean="0"/>
-              <a:t>4 </a:t>
-            </a:r>
-            <a:r>
-              <a:rPr lang="de-CH" dirty="0" err="1" smtClean="0"/>
-              <a:t>Beamer</a:t>
-            </a:r>
-            <a:r>
-              <a:rPr lang="de-CH" dirty="0" smtClean="0"/>
-              <a:t> im Einsatz</a:t>
-            </a:r>
-          </a:p>
-          <a:p>
-            <a:r>
-              <a:rPr lang="de-CH" dirty="0" smtClean="0"/>
-              <a:t>Clusters aufsetzen</a:t>
-            </a:r>
-          </a:p>
-          <a:p>
-            <a:r>
-              <a:rPr lang="de-CH" dirty="0" err="1" smtClean="0"/>
-              <a:t>GeForce</a:t>
-            </a:r>
-            <a:r>
-              <a:rPr lang="de-CH" dirty="0" smtClean="0"/>
-              <a:t> Client aufsetzen</a:t>
-            </a:r>
-          </a:p>
-          <a:p>
-            <a:r>
-              <a:rPr lang="de-CH" dirty="0" err="1" smtClean="0"/>
-              <a:t>Mosaic</a:t>
-            </a:r>
-            <a:r>
-              <a:rPr lang="de-CH" dirty="0" smtClean="0"/>
-              <a:t> Client aufsetzen</a:t>
+              <a:t>Basic Extended</a:t>
             </a:r>
             <a:endParaRPr lang="de-CH" dirty="0"/>
           </a:p>
         </p:txBody>
       </p:sp>
+      <p:pic>
+        <p:nvPicPr>
+          <p:cNvPr id="8" name="Inhaltsplatzhalter 7"/>
+          <p:cNvPicPr>
+            <a:picLocks noGrp="1" noChangeAspect="1"/>
+          </p:cNvPicPr>
+          <p:nvPr>
+            <p:ph sz="half" idx="15"/>
+          </p:nvPr>
+        </p:nvPicPr>
+        <p:blipFill>
+          <a:blip r:embed="rId4">
+            <a:extLst>
+              <a:ext uri="{28A0092B-C50C-407E-A947-70E740481C1C}">
+                <a14:useLocalDpi xmlns:a14="http://schemas.microsoft.com/office/drawing/2010/main" val="0"/>
+              </a:ext>
+            </a:extLst>
+          </a:blip>
+          <a:stretch>
+            <a:fillRect/>
+          </a:stretch>
+        </p:blipFill>
+        <p:spPr>
+          <a:xfrm>
+            <a:off x="4589463" y="1980000"/>
+            <a:ext cx="4051300" cy="2799911"/>
+          </a:xfrm>
+        </p:spPr>
+      </p:pic>
     </p:spTree>
     <p:extLst>
       <p:ext uri="{BB962C8B-B14F-4D97-AF65-F5344CB8AC3E}">
-        <p14:creationId xmlns:p14="http://schemas.microsoft.com/office/powerpoint/2010/main" val="1891937044"/>
+        <p14:creationId xmlns:p14="http://schemas.microsoft.com/office/powerpoint/2010/main" val="3105073695"/>
       </p:ext>
     </p:extLst>
   </p:cSld>
@@ -12266,6 +12089,22 @@
 </file>
 
 <file path=customXml/item1.xml><?xml version="1.0" encoding="utf-8"?>
+<p:properties xmlns:p="http://schemas.microsoft.com/office/2006/metadata/properties" xmlns:xsi="http://www.w3.org/2001/XMLSchema-instance" xmlns:pc="http://schemas.microsoft.com/office/infopath/2007/PartnerControls">
+  <documentManagement>
+    <BfhIntranetDepartmentText xmlns="63c724b1-652e-424f-8d99-4ee509067280">
+      <Terms xmlns="http://schemas.microsoft.com/office/infopath/2007/PartnerControls">
+        <TermInfo xmlns="http://schemas.microsoft.com/office/infopath/2007/PartnerControls">
+          <TermName xmlns="http://schemas.microsoft.com/office/infopath/2007/PartnerControls">Vorlage</TermName>
+          <TermId xmlns="http://schemas.microsoft.com/office/infopath/2007/PartnerControls">de1a6d3c-ac6a-4b34-8edd-308eb81066db</TermId>
+        </TermInfo>
+      </Terms>
+    </BfhIntranetDepartmentText>
+    <QMPilot_DokID xmlns="2551ef7e-3b29-44d1-a8ad-ef34c26bfc60">469</QMPilot_DokID>
+  </documentManagement>
+</p:properties>
+</file>
+
+<file path=customXml/item2.xml><?xml version="1.0" encoding="utf-8"?>
 <ct:contentTypeSchema xmlns:ct="http://schemas.microsoft.com/office/2006/metadata/contentType" xmlns:ma="http://schemas.microsoft.com/office/2006/metadata/properties/metaAttributes" ct:_="" ma:_="" ma:contentTypeName="QMPilot_ContentType" ma:contentTypeID="0x0101009127C3B567804923A8661E062BBD8EF500AB8983C84EF542A7976DC8547A5CDC52001BD440F45714504284DA526949208683" ma:contentTypeVersion="2" ma:contentTypeDescription="Create a new document." ma:contentTypeScope="" ma:versionID="706adce6add7c3bfcb673e0b11f1ed37">
   <xsd:schema xmlns:xsd="http://www.w3.org/2001/XMLSchema" xmlns:xs="http://www.w3.org/2001/XMLSchema" xmlns:p="http://schemas.microsoft.com/office/2006/metadata/properties" xmlns:ns2="63c724b1-652e-424f-8d99-4ee509067280" xmlns:ns3="2551ef7e-3b29-44d1-a8ad-ef34c26bfc60" targetNamespace="http://schemas.microsoft.com/office/2006/metadata/properties" ma:root="true" ma:fieldsID="0765d51910c97ab1de67628eb0dc66fa" ns2:_="" ns3:_="">
     <xsd:import namespace="63c724b1-652e-424f-8d99-4ee509067280"/>
@@ -12404,22 +12243,6 @@
 </ct:contentTypeSchema>
 </file>
 
-<file path=customXml/item2.xml><?xml version="1.0" encoding="utf-8"?>
-<p:properties xmlns:p="http://schemas.microsoft.com/office/2006/metadata/properties" xmlns:xsi="http://www.w3.org/2001/XMLSchema-instance" xmlns:pc="http://schemas.microsoft.com/office/infopath/2007/PartnerControls">
-  <documentManagement>
-    <BfhIntranetDepartmentText xmlns="63c724b1-652e-424f-8d99-4ee509067280">
-      <Terms xmlns="http://schemas.microsoft.com/office/infopath/2007/PartnerControls">
-        <TermInfo xmlns="http://schemas.microsoft.com/office/infopath/2007/PartnerControls">
-          <TermName xmlns="http://schemas.microsoft.com/office/infopath/2007/PartnerControls">Vorlage</TermName>
-          <TermId xmlns="http://schemas.microsoft.com/office/infopath/2007/PartnerControls">de1a6d3c-ac6a-4b34-8edd-308eb81066db</TermId>
-        </TermInfo>
-      </Terms>
-    </BfhIntranetDepartmentText>
-    <QMPilot_DokID xmlns="2551ef7e-3b29-44d1-a8ad-ef34c26bfc60">469</QMPilot_DokID>
-  </documentManagement>
-</p:properties>
-</file>
-
 <file path=customXml/item3.xml><?xml version="1.0" encoding="utf-8"?>
 <?mso-contentType ?>
 <FormTemplates xmlns="http://schemas.microsoft.com/sharepoint/v3/contenttype/forms">
@@ -12430,6 +12253,23 @@
 </file>
 
 <file path=customXml/itemProps1.xml><?xml version="1.0" encoding="utf-8"?>
+<ds:datastoreItem xmlns:ds="http://schemas.openxmlformats.org/officeDocument/2006/customXml" ds:itemID="{96591048-6F15-48C6-9650-9BFF3E56974F}">
+  <ds:schemaRefs>
+    <ds:schemaRef ds:uri="http://purl.org/dc/dcmitype/"/>
+    <ds:schemaRef ds:uri="http://schemas.openxmlformats.org/package/2006/metadata/core-properties"/>
+    <ds:schemaRef ds:uri="http://schemas.microsoft.com/office/infopath/2007/PartnerControls"/>
+    <ds:schemaRef ds:uri="http://purl.org/dc/terms/"/>
+    <ds:schemaRef ds:uri="http://purl.org/dc/elements/1.1/"/>
+    <ds:schemaRef ds:uri="63c724b1-652e-424f-8d99-4ee509067280"/>
+    <ds:schemaRef ds:uri="http://www.w3.org/XML/1998/namespace"/>
+    <ds:schemaRef ds:uri="http://schemas.microsoft.com/office/2006/documentManagement/types"/>
+    <ds:schemaRef ds:uri="2551ef7e-3b29-44d1-a8ad-ef34c26bfc60"/>
+    <ds:schemaRef ds:uri="http://schemas.microsoft.com/office/2006/metadata/properties"/>
+  </ds:schemaRefs>
+</ds:datastoreItem>
+</file>
+
+<file path=customXml/itemProps2.xml><?xml version="1.0" encoding="utf-8"?>
 <ds:datastoreItem xmlns:ds="http://schemas.openxmlformats.org/officeDocument/2006/customXml" ds:itemID="{6A51C7F3-86FD-4A82-8259-3C4C8E258325}">
   <ds:schemaRefs>
     <ds:schemaRef ds:uri="http://schemas.microsoft.com/office/2006/metadata/contentType"/>
@@ -12448,23 +12288,6 @@
 </ds:datastoreItem>
 </file>
 
-<file path=customXml/itemProps2.xml><?xml version="1.0" encoding="utf-8"?>
-<ds:datastoreItem xmlns:ds="http://schemas.openxmlformats.org/officeDocument/2006/customXml" ds:itemID="{96591048-6F15-48C6-9650-9BFF3E56974F}">
-  <ds:schemaRefs>
-    <ds:schemaRef ds:uri="http://purl.org/dc/dcmitype/"/>
-    <ds:schemaRef ds:uri="http://schemas.openxmlformats.org/package/2006/metadata/core-properties"/>
-    <ds:schemaRef ds:uri="http://schemas.microsoft.com/office/infopath/2007/PartnerControls"/>
-    <ds:schemaRef ds:uri="http://purl.org/dc/terms/"/>
-    <ds:schemaRef ds:uri="http://purl.org/dc/elements/1.1/"/>
-    <ds:schemaRef ds:uri="63c724b1-652e-424f-8d99-4ee509067280"/>
-    <ds:schemaRef ds:uri="http://www.w3.org/XML/1998/namespace"/>
-    <ds:schemaRef ds:uri="http://schemas.microsoft.com/office/2006/documentManagement/types"/>
-    <ds:schemaRef ds:uri="2551ef7e-3b29-44d1-a8ad-ef34c26bfc60"/>
-    <ds:schemaRef ds:uri="http://schemas.microsoft.com/office/2006/metadata/properties"/>
-  </ds:schemaRefs>
-</ds:datastoreItem>
-</file>
-
 <file path=customXml/itemProps3.xml><?xml version="1.0" encoding="utf-8"?>
 <ds:datastoreItem xmlns:ds="http://schemas.openxmlformats.org/officeDocument/2006/customXml" ds:itemID="{CCF5E5E7-7F77-47A8-99A9-B4D5839292F3}">
   <ds:schemaRefs>

</xml_diff>